<commit_message>
Spence -> Spencer on title slide
</commit_message>
<xml_diff>
--- a/Documentation/Presentations/CS425 Final Presentation.pptx
+++ b/Documentation/Presentations/CS425 Final Presentation.pptx
@@ -295,7 +295,7 @@
           <a:p>
             <a:fld id="{4954C6E1-AF92-4FB7-A013-0B520EBC30AE}" type="datetimeFigureOut">
               <a:rPr lang="en-US"/>
-              <a:t>11/8/2015</a:t>
+              <a:t>11/16/2015</a:t>
             </a:fld>
             <a:endParaRPr/>
           </a:p>
@@ -460,7 +460,7 @@
           <a:p>
             <a:fld id="{95C10850-0874-4A61-99B4-D613C5E8D9EA}" type="datetimeFigureOut">
               <a:rPr lang="en-US"/>
-              <a:t>11/8/2015</a:t>
+              <a:t>11/16/2015</a:t>
             </a:fld>
             <a:endParaRPr/>
           </a:p>
@@ -4700,7 +4700,18 @@
                   </a:schemeClr>
                 </a:solidFill>
               </a:rPr>
-              <a:t>Spence Smith</a:t>
+              <a:t>Spencer </a:t>
+            </a:r>
+            <a:r>
+              <a:rPr lang="en-US" sz="2400" dirty="0" smtClean="0">
+                <a:solidFill>
+                  <a:schemeClr val="tx2">
+                    <a:lumMod val="90000"/>
+                    <a:lumOff val="10000"/>
+                  </a:schemeClr>
+                </a:solidFill>
+              </a:rPr>
+              <a:t>Smith</a:t>
             </a:r>
           </a:p>
           <a:p>

</xml_diff>

<commit_message>
Removed Jenkins screenshot slide as unnecessary
</commit_message>
<xml_diff>
--- a/Documentation/Presentations/CS425 Final Presentation.pptx
+++ b/Documentation/Presentations/CS425 Final Presentation.pptx
@@ -5,10 +5,10 @@
     <p:sldMasterId id="2147483808" r:id="rId2"/>
   </p:sldMasterIdLst>
   <p:notesMasterIdLst>
-    <p:notesMasterId r:id="rId19"/>
+    <p:notesMasterId r:id="rId18"/>
   </p:notesMasterIdLst>
   <p:handoutMasterIdLst>
-    <p:handoutMasterId r:id="rId20"/>
+    <p:handoutMasterId r:id="rId19"/>
   </p:handoutMasterIdLst>
   <p:sldIdLst>
     <p:sldId id="259" r:id="rId3"/>
@@ -16,17 +16,16 @@
     <p:sldId id="264" r:id="rId5"/>
     <p:sldId id="267" r:id="rId6"/>
     <p:sldId id="273" r:id="rId7"/>
-    <p:sldId id="276" r:id="rId8"/>
-    <p:sldId id="265" r:id="rId9"/>
-    <p:sldId id="268" r:id="rId10"/>
-    <p:sldId id="277" r:id="rId11"/>
-    <p:sldId id="266" r:id="rId12"/>
-    <p:sldId id="269" r:id="rId13"/>
-    <p:sldId id="279" r:id="rId14"/>
-    <p:sldId id="270" r:id="rId15"/>
-    <p:sldId id="271" r:id="rId16"/>
-    <p:sldId id="272" r:id="rId17"/>
-    <p:sldId id="278" r:id="rId18"/>
+    <p:sldId id="265" r:id="rId8"/>
+    <p:sldId id="268" r:id="rId9"/>
+    <p:sldId id="277" r:id="rId10"/>
+    <p:sldId id="266" r:id="rId11"/>
+    <p:sldId id="269" r:id="rId12"/>
+    <p:sldId id="279" r:id="rId13"/>
+    <p:sldId id="270" r:id="rId14"/>
+    <p:sldId id="271" r:id="rId15"/>
+    <p:sldId id="272" r:id="rId16"/>
+    <p:sldId id="278" r:id="rId17"/>
   </p:sldIdLst>
   <p:sldSz cx="12188825" cy="6858000"/>
   <p:notesSz cx="6858000" cy="9144000"/>
@@ -960,7 +959,7 @@
           <a:p>
             <a:fld id="{9E11EC53-F507-411E-9ADC-FBCFECE09D3D}" type="slidenum">
               <a:rPr lang="en-US" smtClean="0"/>
-              <a:t>7</a:t>
+              <a:t>6</a:t>
             </a:fld>
             <a:endParaRPr lang="en-US"/>
           </a:p>
@@ -4933,79 +4932,43 @@
             <a:pPr algn="ctr"/>
             <a:r>
               <a:rPr lang="en-US" dirty="0" smtClean="0"/>
-              <a:t>Architecture</a:t>
+              <a:t>Efforts &amp;Deliverables</a:t>
             </a:r>
             <a:endParaRPr lang="en-US" dirty="0"/>
           </a:p>
         </p:txBody>
       </p:sp>
-      <p:pic>
-        <p:nvPicPr>
-          <p:cNvPr id="10" name="Picture Placeholder 9"/>
-          <p:cNvPicPr>
-            <a:picLocks noGrp="1" noChangeAspect="1"/>
-          </p:cNvPicPr>
-          <p:nvPr>
-            <p:ph type="pic" idx="1"/>
-          </p:nvPr>
-        </p:nvPicPr>
-        <p:blipFill>
-          <a:blip r:embed="rId2"/>
-          <a:srcRect l="1705" r="1705"/>
-          <a:stretch>
-            <a:fillRect/>
-          </a:stretch>
-        </p:blipFill>
-        <p:spPr>
-          <a:xfrm>
-            <a:off x="379412" y="2528023"/>
-            <a:ext cx="6124885" cy="3931920"/>
-          </a:xfrm>
-          <a:prstGeom prst="rect">
-            <a:avLst/>
-          </a:prstGeom>
-        </p:spPr>
-      </p:pic>
-      <p:sp>
-        <p:nvSpPr>
-          <p:cNvPr id="9" name="Text Placeholder 8"/>
-          <p:cNvSpPr>
-            <a:spLocks noGrp="1"/>
-          </p:cNvSpPr>
-          <p:nvPr>
-            <p:ph type="body" sz="half" idx="2"/>
-          </p:nvPr>
-        </p:nvSpPr>
-        <p:spPr>
-          <a:xfrm>
-            <a:off x="7530746" y="2248446"/>
-            <a:ext cx="3598414" cy="3912445"/>
-          </a:xfrm>
-        </p:spPr>
-        <p:txBody>
-          <a:bodyPr/>
-          <a:lstStyle/>
-          <a:p>
-            <a:pPr algn="ctr"/>
-            <a:r>
-              <a:rPr lang="en-US" sz="3200" u="sng" dirty="0" smtClean="0"/>
-              <a:t>MEAN Tech </a:t>
-            </a:r>
-            <a:r>
-              <a:rPr lang="en-US" sz="3200" u="sng" dirty="0"/>
-              <a:t>S</a:t>
-            </a:r>
-            <a:r>
-              <a:rPr lang="en-US" sz="3200" u="sng" dirty="0" smtClean="0"/>
-              <a:t>tack</a:t>
-            </a:r>
-          </a:p>
-          <a:p>
-            <a:pPr marL="285750" indent="-285750">
-              <a:buFont typeface="Arial" panose="020B0604020202020204" pitchFamily="34" charset="0"/>
-              <a:buChar char="•"/>
-            </a:pPr>
-            <a:endParaRPr lang="en-US" dirty="0"/>
+      <p:sp>
+        <p:nvSpPr>
+          <p:cNvPr id="3" name="Content Placeholder 2"/>
+          <p:cNvSpPr>
+            <a:spLocks noGrp="1"/>
+          </p:cNvSpPr>
+          <p:nvPr>
+            <p:ph idx="1"/>
+          </p:nvPr>
+        </p:nvSpPr>
+        <p:spPr/>
+        <p:txBody>
+          <a:bodyPr/>
+          <a:lstStyle/>
+          <a:p>
+            <a:r>
+              <a:rPr lang="en-US" dirty="0" smtClean="0"/>
+              <a:t>Prototype</a:t>
+            </a:r>
+          </a:p>
+          <a:p>
+            <a:r>
+              <a:rPr lang="en-US" dirty="0" smtClean="0"/>
+              <a:t>*INSERT GIF/VIDEO OF PROTOYPE*</a:t>
+            </a:r>
+          </a:p>
+          <a:p>
+            <a:r>
+              <a:rPr lang="en-US" dirty="0" smtClean="0"/>
+              <a:t>*INSERT GIF/VIDEO OF CODE SETUP*</a:t>
+            </a:r>
           </a:p>
         </p:txBody>
       </p:sp>
@@ -5078,285 +5041,10 @@
           </a:p>
         </p:txBody>
       </p:sp>
-      <p:pic>
-        <p:nvPicPr>
-          <p:cNvPr id="11" name="Picture 10"/>
-          <p:cNvPicPr>
-            <a:picLocks noChangeAspect="1"/>
-          </p:cNvPicPr>
-          <p:nvPr/>
-        </p:nvPicPr>
-        <p:blipFill>
-          <a:blip r:embed="rId3">
-            <a:extLst>
-              <a:ext uri="{28A0092B-C50C-407E-A947-70E740481C1C}">
-                <a14:useLocalDpi xmlns:a14="http://schemas.microsoft.com/office/drawing/2010/main" val="0"/>
-              </a:ext>
-            </a:extLst>
-          </a:blip>
-          <a:stretch>
-            <a:fillRect/>
-          </a:stretch>
-        </p:blipFill>
-        <p:spPr>
-          <a:xfrm>
-            <a:off x="6789159" y="4716367"/>
-            <a:ext cx="1896897" cy="504679"/>
-          </a:xfrm>
-          <a:prstGeom prst="rect">
-            <a:avLst/>
-          </a:prstGeom>
-        </p:spPr>
-      </p:pic>
-      <p:sp>
-        <p:nvSpPr>
-          <p:cNvPr id="12" name="TextBox 11"/>
-          <p:cNvSpPr txBox="1"/>
-          <p:nvPr/>
-        </p:nvSpPr>
-        <p:spPr>
-          <a:xfrm>
-            <a:off x="8837612" y="4737873"/>
-            <a:ext cx="3112331" cy="461665"/>
-          </a:xfrm>
-          <a:prstGeom prst="rect">
-            <a:avLst/>
-          </a:prstGeom>
-          <a:noFill/>
-        </p:spPr>
-        <p:txBody>
-          <a:bodyPr wrap="square" rtlCol="0">
-            <a:spAutoFit/>
-          </a:bodyPr>
-          <a:lstStyle/>
-          <a:p>
-            <a:r>
-              <a:rPr lang="en-US" dirty="0" smtClean="0"/>
-              <a:t>AngularJS – Client Side</a:t>
-            </a:r>
-            <a:endParaRPr lang="en-US" dirty="0"/>
-          </a:p>
-        </p:txBody>
-      </p:sp>
-      <p:pic>
-        <p:nvPicPr>
-          <p:cNvPr id="13" name="Picture 12"/>
-          <p:cNvPicPr>
-            <a:picLocks noChangeAspect="1"/>
-          </p:cNvPicPr>
-          <p:nvPr/>
-        </p:nvPicPr>
-        <p:blipFill>
-          <a:blip r:embed="rId4">
-            <a:extLst>
-              <a:ext uri="{28A0092B-C50C-407E-A947-70E740481C1C}">
-                <a14:useLocalDpi xmlns:a14="http://schemas.microsoft.com/office/drawing/2010/main" val="0"/>
-              </a:ext>
-            </a:extLst>
-          </a:blip>
-          <a:stretch>
-            <a:fillRect/>
-          </a:stretch>
-        </p:blipFill>
-        <p:spPr>
-          <a:xfrm>
-            <a:off x="6780211" y="3348758"/>
-            <a:ext cx="1881769" cy="554531"/>
-          </a:xfrm>
-          <a:prstGeom prst="rect">
-            <a:avLst/>
-          </a:prstGeom>
-        </p:spPr>
-      </p:pic>
-      <p:sp>
-        <p:nvSpPr>
-          <p:cNvPr id="14" name="TextBox 13"/>
-          <p:cNvSpPr txBox="1"/>
-          <p:nvPr/>
-        </p:nvSpPr>
-        <p:spPr>
-          <a:xfrm>
-            <a:off x="8837612" y="3348758"/>
-            <a:ext cx="2895600" cy="461665"/>
-          </a:xfrm>
-          <a:prstGeom prst="rect">
-            <a:avLst/>
-          </a:prstGeom>
-          <a:noFill/>
-        </p:spPr>
-        <p:txBody>
-          <a:bodyPr wrap="square" rtlCol="0">
-            <a:spAutoFit/>
-          </a:bodyPr>
-          <a:lstStyle/>
-          <a:p>
-            <a:r>
-              <a:rPr lang="en-US" dirty="0" smtClean="0"/>
-              <a:t>MongoDB- Database</a:t>
-            </a:r>
-            <a:endParaRPr lang="en-US" dirty="0"/>
-          </a:p>
-        </p:txBody>
-      </p:sp>
-      <p:pic>
-        <p:nvPicPr>
-          <p:cNvPr id="15" name="Picture 14"/>
-          <p:cNvPicPr>
-            <a:picLocks noChangeAspect="1"/>
-          </p:cNvPicPr>
-          <p:nvPr/>
-        </p:nvPicPr>
-        <p:blipFill>
-          <a:blip r:embed="rId5">
-            <a:extLst>
-              <a:ext uri="{28A0092B-C50C-407E-A947-70E740481C1C}">
-                <a14:useLocalDpi xmlns:a14="http://schemas.microsoft.com/office/drawing/2010/main" val="0"/>
-              </a:ext>
-            </a:extLst>
-          </a:blip>
-          <a:stretch>
-            <a:fillRect/>
-          </a:stretch>
-        </p:blipFill>
-        <p:spPr>
-          <a:xfrm>
-            <a:off x="6789159" y="3990517"/>
-            <a:ext cx="1887949" cy="533400"/>
-          </a:xfrm>
-          <a:prstGeom prst="rect">
-            <a:avLst/>
-          </a:prstGeom>
-        </p:spPr>
-      </p:pic>
-      <p:sp>
-        <p:nvSpPr>
-          <p:cNvPr id="16" name="TextBox 15"/>
-          <p:cNvSpPr txBox="1"/>
-          <p:nvPr/>
-        </p:nvSpPr>
-        <p:spPr>
-          <a:xfrm>
-            <a:off x="8837612" y="3990517"/>
-            <a:ext cx="2819400" cy="461665"/>
-          </a:xfrm>
-          <a:prstGeom prst="rect">
-            <a:avLst/>
-          </a:prstGeom>
-          <a:noFill/>
-        </p:spPr>
-        <p:txBody>
-          <a:bodyPr wrap="square" rtlCol="0">
-            <a:spAutoFit/>
-          </a:bodyPr>
-          <a:lstStyle/>
-          <a:p>
-            <a:r>
-              <a:rPr lang="en-US" dirty="0" smtClean="0"/>
-              <a:t>Express -Middleware</a:t>
-            </a:r>
-            <a:endParaRPr lang="en-US" dirty="0"/>
-          </a:p>
-        </p:txBody>
-      </p:sp>
-      <p:pic>
-        <p:nvPicPr>
-          <p:cNvPr id="18" name="Picture 17"/>
-          <p:cNvPicPr>
-            <a:picLocks noChangeAspect="1"/>
-          </p:cNvPicPr>
-          <p:nvPr/>
-        </p:nvPicPr>
-        <p:blipFill>
-          <a:blip r:embed="rId6">
-            <a:extLst>
-              <a:ext uri="{28A0092B-C50C-407E-A947-70E740481C1C}">
-                <a14:useLocalDpi xmlns:a14="http://schemas.microsoft.com/office/drawing/2010/main" val="0"/>
-              </a:ext>
-            </a:extLst>
-          </a:blip>
-          <a:stretch>
-            <a:fillRect/>
-          </a:stretch>
-        </p:blipFill>
-        <p:spPr>
-          <a:xfrm>
-            <a:off x="6813694" y="5457956"/>
-            <a:ext cx="1872362" cy="605110"/>
-          </a:xfrm>
-          <a:prstGeom prst="rect">
-            <a:avLst/>
-          </a:prstGeom>
-        </p:spPr>
-      </p:pic>
-      <p:sp>
-        <p:nvSpPr>
-          <p:cNvPr id="19" name="TextBox 18"/>
-          <p:cNvSpPr txBox="1"/>
-          <p:nvPr/>
-        </p:nvSpPr>
-        <p:spPr>
-          <a:xfrm>
-            <a:off x="8837612" y="5437262"/>
-            <a:ext cx="2932400" cy="461665"/>
-          </a:xfrm>
-          <a:prstGeom prst="rect">
-            <a:avLst/>
-          </a:prstGeom>
-          <a:noFill/>
-        </p:spPr>
-        <p:txBody>
-          <a:bodyPr wrap="square" rtlCol="0">
-            <a:spAutoFit/>
-          </a:bodyPr>
-          <a:lstStyle/>
-          <a:p>
-            <a:r>
-              <a:rPr lang="en-US" dirty="0" err="1" smtClean="0"/>
-              <a:t>NodeJS</a:t>
-            </a:r>
-            <a:r>
-              <a:rPr lang="en-US" dirty="0" smtClean="0"/>
-              <a:t>- Server Side</a:t>
-            </a:r>
-            <a:endParaRPr lang="en-US" dirty="0"/>
-          </a:p>
-        </p:txBody>
-      </p:sp>
-      <p:sp>
-        <p:nvSpPr>
-          <p:cNvPr id="20" name="TextBox 19"/>
-          <p:cNvSpPr txBox="1"/>
-          <p:nvPr/>
-        </p:nvSpPr>
-        <p:spPr>
-          <a:xfrm>
-            <a:off x="660554" y="1921892"/>
-            <a:ext cx="5562600" cy="461665"/>
-          </a:xfrm>
-          <a:prstGeom prst="rect">
-            <a:avLst/>
-          </a:prstGeom>
-          <a:noFill/>
-        </p:spPr>
-        <p:txBody>
-          <a:bodyPr wrap="square" rtlCol="0">
-            <a:spAutoFit/>
-          </a:bodyPr>
-          <a:lstStyle/>
-          <a:p>
-            <a:pPr algn="ctr"/>
-            <a:r>
-              <a:rPr lang="en-US" dirty="0" smtClean="0"/>
-              <a:t>Client/Server Configuration</a:t>
-            </a:r>
-            <a:endParaRPr lang="en-US" dirty="0"/>
-          </a:p>
-        </p:txBody>
-      </p:sp>
     </p:spTree>
     <p:extLst>
       <p:ext uri="{BB962C8B-B14F-4D97-AF65-F5344CB8AC3E}">
-        <p14:creationId xmlns:p14="http://schemas.microsoft.com/office/powerpoint/2010/main" val="12138330"/>
+        <p14:creationId xmlns:p14="http://schemas.microsoft.com/office/powerpoint/2010/main" val="676408493"/>
       </p:ext>
     </p:extLst>
   </p:cSld>
@@ -5422,7 +5110,11 @@
               <a:rPr lang="en-US" dirty="0" smtClean="0"/>
               <a:t>Efforts &amp;Deliverables</a:t>
             </a:r>
-            <a:endParaRPr lang="en-US" dirty="0"/>
+            <a:r>
+              <a:rPr lang="en-US" sz="2000" i="1" dirty="0" smtClean="0"/>
+              <a:t>(cont.)</a:t>
+            </a:r>
+            <a:endParaRPr lang="en-US" sz="2000" i="1" dirty="0"/>
           </a:p>
         </p:txBody>
       </p:sp>
@@ -5532,7 +5224,7 @@
     </p:spTree>
     <p:extLst>
       <p:ext uri="{BB962C8B-B14F-4D97-AF65-F5344CB8AC3E}">
-        <p14:creationId xmlns:p14="http://schemas.microsoft.com/office/powerpoint/2010/main" val="676408493"/>
+        <p14:creationId xmlns:p14="http://schemas.microsoft.com/office/powerpoint/2010/main" val="1883410899"/>
       </p:ext>
     </p:extLst>
   </p:cSld>
@@ -5596,13 +5288,9 @@
             <a:pPr algn="ctr"/>
             <a:r>
               <a:rPr lang="en-US" dirty="0" smtClean="0"/>
-              <a:t>Efforts &amp;Deliverables</a:t>
-            </a:r>
-            <a:r>
-              <a:rPr lang="en-US" sz="2000" i="1" dirty="0" smtClean="0"/>
-              <a:t>(cont.)</a:t>
-            </a:r>
-            <a:endParaRPr lang="en-US" sz="2000" i="1" dirty="0"/>
+              <a:t>Cs425 exit strategy</a:t>
+            </a:r>
+            <a:endParaRPr lang="en-US" dirty="0"/>
           </a:p>
         </p:txBody>
       </p:sp>
@@ -5618,24 +5306,45 @@
         </p:nvSpPr>
         <p:spPr/>
         <p:txBody>
-          <a:bodyPr/>
-          <a:lstStyle/>
-          <a:p>
-            <a:r>
-              <a:rPr lang="en-US" dirty="0" smtClean="0"/>
-              <a:t>Prototype</a:t>
-            </a:r>
-          </a:p>
-          <a:p>
-            <a:r>
-              <a:rPr lang="en-US" dirty="0" smtClean="0"/>
-              <a:t>*INSERT GIF/VIDEO OF PROTOYPE*</a:t>
-            </a:r>
-          </a:p>
-          <a:p>
-            <a:r>
-              <a:rPr lang="en-US" dirty="0" smtClean="0"/>
-              <a:t>*INSERT GIF/VIDEO OF CODE SETUP*</a:t>
+          <a:bodyPr>
+            <a:normAutofit/>
+          </a:bodyPr>
+          <a:lstStyle/>
+          <a:p>
+            <a:r>
+              <a:rPr lang="en-US" sz="2800" dirty="0" smtClean="0"/>
+              <a:t>Met:</a:t>
+            </a:r>
+          </a:p>
+          <a:p>
+            <a:pPr lvl="1"/>
+            <a:r>
+              <a:rPr lang="en-US" sz="2800" dirty="0" smtClean="0"/>
+              <a:t>Working prototype with base/minimal functionality of visualization</a:t>
+            </a:r>
+          </a:p>
+          <a:p>
+            <a:pPr lvl="1"/>
+            <a:r>
+              <a:rPr lang="en-US" sz="2800" dirty="0" smtClean="0"/>
+              <a:t>Familiarization of tech stack of all members of the team</a:t>
+            </a:r>
+          </a:p>
+          <a:p>
+            <a:pPr lvl="1"/>
+            <a:endParaRPr lang="en-US" sz="2800" dirty="0"/>
+          </a:p>
+          <a:p>
+            <a:r>
+              <a:rPr lang="en-US" sz="2800" dirty="0" smtClean="0"/>
+              <a:t>Was Not Met:</a:t>
+            </a:r>
+          </a:p>
+          <a:p>
+            <a:pPr lvl="1"/>
+            <a:r>
+              <a:rPr lang="en-US" sz="2800" dirty="0" smtClean="0"/>
+              <a:t>N/A</a:t>
             </a:r>
           </a:p>
         </p:txBody>
@@ -5712,7 +5421,7 @@
     </p:spTree>
     <p:extLst>
       <p:ext uri="{BB962C8B-B14F-4D97-AF65-F5344CB8AC3E}">
-        <p14:creationId xmlns:p14="http://schemas.microsoft.com/office/powerpoint/2010/main" val="1883410899"/>
+        <p14:creationId xmlns:p14="http://schemas.microsoft.com/office/powerpoint/2010/main" val="1364081688"/>
       </p:ext>
     </p:extLst>
   </p:cSld>
@@ -5776,7 +5485,7 @@
             <a:pPr algn="ctr"/>
             <a:r>
               <a:rPr lang="en-US" dirty="0" smtClean="0"/>
-              <a:t>Cs425 exit strategy</a:t>
+              <a:t>Post-Mortem</a:t>
             </a:r>
             <a:endParaRPr lang="en-US" dirty="0"/>
           </a:p>
@@ -5794,46 +5503,68 @@
         </p:nvSpPr>
         <p:spPr/>
         <p:txBody>
-          <a:bodyPr>
-            <a:normAutofit/>
-          </a:bodyPr>
-          <a:lstStyle/>
-          <a:p>
-            <a:r>
-              <a:rPr lang="en-US" sz="2800" dirty="0" smtClean="0"/>
-              <a:t>Met:</a:t>
+          <a:bodyPr/>
+          <a:lstStyle/>
+          <a:p>
+            <a:r>
+              <a:rPr lang="en-US" dirty="0" smtClean="0"/>
+              <a:t>Good:</a:t>
             </a:r>
           </a:p>
           <a:p>
             <a:pPr lvl="1"/>
             <a:r>
-              <a:rPr lang="en-US" sz="2800" dirty="0" smtClean="0"/>
-              <a:t>Working prototype with base/minimal functionality of visualization</a:t>
+              <a:rPr lang="en-US" dirty="0" smtClean="0"/>
+              <a:t>Processes set-in and adopted by every team member.</a:t>
             </a:r>
           </a:p>
           <a:p>
             <a:pPr lvl="1"/>
             <a:r>
-              <a:rPr lang="en-US" sz="2800" dirty="0" smtClean="0"/>
-              <a:t>Familiarization of tech stack of all members of the team</a:t>
+              <a:rPr lang="en-US" dirty="0" smtClean="0"/>
+              <a:t>Great base project to work off of for next semester.</a:t>
             </a:r>
           </a:p>
           <a:p>
             <a:pPr lvl="1"/>
-            <a:endParaRPr lang="en-US" sz="2800" dirty="0"/>
-          </a:p>
-          <a:p>
-            <a:r>
-              <a:rPr lang="en-US" sz="2800" dirty="0" smtClean="0"/>
-              <a:t>Was Not Met:</a:t>
+            <a:r>
+              <a:rPr lang="en-US" dirty="0" smtClean="0"/>
+              <a:t>Team learned a completely new tech stack.</a:t>
             </a:r>
           </a:p>
           <a:p>
             <a:pPr lvl="1"/>
-            <a:r>
-              <a:rPr lang="en-US" sz="2800" dirty="0" smtClean="0"/>
-              <a:t>N/A</a:t>
-            </a:r>
+            <a:endParaRPr lang="en-US" dirty="0"/>
+          </a:p>
+          <a:p>
+            <a:r>
+              <a:rPr lang="en-US" dirty="0" smtClean="0"/>
+              <a:t>Bad:</a:t>
+            </a:r>
+          </a:p>
+          <a:p>
+            <a:pPr lvl="1"/>
+            <a:r>
+              <a:rPr lang="en-US" dirty="0" smtClean="0"/>
+              <a:t>Time planning was slow at first. </a:t>
+            </a:r>
+          </a:p>
+          <a:p>
+            <a:pPr lvl="1"/>
+            <a:r>
+              <a:rPr lang="en-US" dirty="0" smtClean="0"/>
+              <a:t>Didn’t get to writing tests for the prototype</a:t>
+            </a:r>
+          </a:p>
+          <a:p>
+            <a:pPr marL="228532" lvl="1" indent="0">
+              <a:buNone/>
+            </a:pPr>
+            <a:endParaRPr lang="en-US" dirty="0" smtClean="0"/>
+          </a:p>
+          <a:p>
+            <a:pPr lvl="1"/>
+            <a:endParaRPr lang="en-US" dirty="0"/>
           </a:p>
         </p:txBody>
       </p:sp>
@@ -5909,7 +5640,7 @@
     </p:spTree>
     <p:extLst>
       <p:ext uri="{BB962C8B-B14F-4D97-AF65-F5344CB8AC3E}">
-        <p14:creationId xmlns:p14="http://schemas.microsoft.com/office/powerpoint/2010/main" val="1364081688"/>
+        <p14:creationId xmlns:p14="http://schemas.microsoft.com/office/powerpoint/2010/main" val="3671086265"/>
       </p:ext>
     </p:extLst>
   </p:cSld>
@@ -5967,15 +5698,17 @@
         </p:nvSpPr>
         <p:spPr/>
         <p:txBody>
-          <a:bodyPr/>
+          <a:bodyPr>
+            <a:normAutofit/>
+          </a:bodyPr>
           <a:lstStyle/>
           <a:p>
             <a:pPr algn="ctr"/>
             <a:r>
-              <a:rPr lang="en-US" dirty="0" smtClean="0"/>
-              <a:t>Post-Mortem</a:t>
-            </a:r>
-            <a:endParaRPr lang="en-US" dirty="0"/>
+              <a:rPr lang="en-US" sz="4800" dirty="0" smtClean="0"/>
+              <a:t>Cs 499</a:t>
+            </a:r>
+            <a:endParaRPr lang="en-US" sz="4800" dirty="0"/>
           </a:p>
         </p:txBody>
       </p:sp>
@@ -5994,64 +5727,44 @@
           <a:bodyPr/>
           <a:lstStyle/>
           <a:p>
-            <a:r>
-              <a:rPr lang="en-US" dirty="0" smtClean="0"/>
-              <a:t>Good:</a:t>
-            </a:r>
-          </a:p>
-          <a:p>
-            <a:pPr lvl="1"/>
-            <a:r>
-              <a:rPr lang="en-US" dirty="0" smtClean="0"/>
-              <a:t>Processes set-in and adopted by every team member.</a:t>
-            </a:r>
-          </a:p>
-          <a:p>
-            <a:pPr lvl="1"/>
-            <a:r>
-              <a:rPr lang="en-US" dirty="0" smtClean="0"/>
-              <a:t>Great base project to work off of for next semester.</a:t>
-            </a:r>
-          </a:p>
-          <a:p>
-            <a:pPr lvl="1"/>
-            <a:r>
-              <a:rPr lang="en-US" dirty="0" smtClean="0"/>
-              <a:t>Team learned a completely new tech stack.</a:t>
-            </a:r>
-          </a:p>
-          <a:p>
-            <a:pPr lvl="1"/>
-            <a:endParaRPr lang="en-US" dirty="0"/>
-          </a:p>
-          <a:p>
-            <a:r>
-              <a:rPr lang="en-US" dirty="0" smtClean="0"/>
-              <a:t>Bad:</a:t>
-            </a:r>
-          </a:p>
-          <a:p>
-            <a:pPr lvl="1"/>
-            <a:r>
-              <a:rPr lang="en-US" dirty="0" smtClean="0"/>
-              <a:t>Time planning was slow at first. </a:t>
-            </a:r>
-          </a:p>
-          <a:p>
-            <a:pPr lvl="1"/>
-            <a:r>
-              <a:rPr lang="en-US" dirty="0" smtClean="0"/>
-              <a:t>Didn’t get to writing tests for the prototype</a:t>
-            </a:r>
-          </a:p>
-          <a:p>
-            <a:pPr marL="228532" lvl="1" indent="0">
+            <a:pPr marL="0" indent="0" algn="ctr">
               <a:buNone/>
             </a:pPr>
+            <a:r>
+              <a:rPr lang="en-US" sz="3200" u="sng" dirty="0" smtClean="0"/>
+              <a:t>Next Semester</a:t>
+            </a:r>
+          </a:p>
+          <a:p>
+            <a:r>
+              <a:rPr lang="en-US" dirty="0" smtClean="0"/>
+              <a:t>Our goal going forward is to use all the processes we set this semester and become a high performing agile team.</a:t>
+            </a:r>
+          </a:p>
+          <a:p>
+            <a:r>
+              <a:rPr lang="en-US" dirty="0" smtClean="0"/>
+              <a:t> We want to take the existing prototype and start to add scoring algorithms and UI changes</a:t>
+            </a:r>
+          </a:p>
+          <a:p>
+            <a:r>
+              <a:rPr lang="en-US" dirty="0" smtClean="0"/>
+              <a:t>Implement a dynamic testing suite for existing code.</a:t>
+            </a:r>
+          </a:p>
+          <a:p>
+            <a:r>
+              <a:rPr lang="en-US" dirty="0" smtClean="0"/>
+              <a:t>Develop with Angular and Node “best practices</a:t>
+            </a:r>
+            <a:r>
+              <a:rPr lang="en-US" smtClean="0"/>
+              <a:t>” in mind.</a:t>
+            </a:r>
             <a:endParaRPr lang="en-US" dirty="0" smtClean="0"/>
           </a:p>
           <a:p>
-            <a:pPr lvl="1"/>
             <a:endParaRPr lang="en-US" dirty="0"/>
           </a:p>
         </p:txBody>
@@ -6128,7 +5841,7 @@
     </p:spTree>
     <p:extLst>
       <p:ext uri="{BB962C8B-B14F-4D97-AF65-F5344CB8AC3E}">
-        <p14:creationId xmlns:p14="http://schemas.microsoft.com/office/powerpoint/2010/main" val="3671086265"/>
+        <p14:creationId xmlns:p14="http://schemas.microsoft.com/office/powerpoint/2010/main" val="3259073913"/>
       </p:ext>
     </p:extLst>
   </p:cSld>
@@ -6176,89 +5889,6 @@
       </p:grpSpPr>
       <p:sp>
         <p:nvSpPr>
-          <p:cNvPr id="2" name="Title 1"/>
-          <p:cNvSpPr>
-            <a:spLocks noGrp="1"/>
-          </p:cNvSpPr>
-          <p:nvPr>
-            <p:ph type="title"/>
-          </p:nvPr>
-        </p:nvSpPr>
-        <p:spPr/>
-        <p:txBody>
-          <a:bodyPr>
-            <a:normAutofit/>
-          </a:bodyPr>
-          <a:lstStyle/>
-          <a:p>
-            <a:pPr algn="ctr"/>
-            <a:r>
-              <a:rPr lang="en-US" sz="4800" dirty="0" smtClean="0"/>
-              <a:t>Cs 499</a:t>
-            </a:r>
-            <a:endParaRPr lang="en-US" sz="4800" dirty="0"/>
-          </a:p>
-        </p:txBody>
-      </p:sp>
-      <p:sp>
-        <p:nvSpPr>
-          <p:cNvPr id="3" name="Content Placeholder 2"/>
-          <p:cNvSpPr>
-            <a:spLocks noGrp="1"/>
-          </p:cNvSpPr>
-          <p:nvPr>
-            <p:ph idx="1"/>
-          </p:nvPr>
-        </p:nvSpPr>
-        <p:spPr/>
-        <p:txBody>
-          <a:bodyPr/>
-          <a:lstStyle/>
-          <a:p>
-            <a:pPr marL="0" indent="0" algn="ctr">
-              <a:buNone/>
-            </a:pPr>
-            <a:r>
-              <a:rPr lang="en-US" sz="3200" u="sng" dirty="0" smtClean="0"/>
-              <a:t>Next Semester</a:t>
-            </a:r>
-          </a:p>
-          <a:p>
-            <a:r>
-              <a:rPr lang="en-US" dirty="0" smtClean="0"/>
-              <a:t>Our goal going forward is to use all the processes we set this semester and become a high performing agile team.</a:t>
-            </a:r>
-          </a:p>
-          <a:p>
-            <a:r>
-              <a:rPr lang="en-US" dirty="0" smtClean="0"/>
-              <a:t> We want to take the existing prototype and start to add scoring algorithms and UI changes</a:t>
-            </a:r>
-          </a:p>
-          <a:p>
-            <a:r>
-              <a:rPr lang="en-US" dirty="0" smtClean="0"/>
-              <a:t>Implement a dynamic testing suite for existing code.</a:t>
-            </a:r>
-          </a:p>
-          <a:p>
-            <a:r>
-              <a:rPr lang="en-US" dirty="0" smtClean="0"/>
-              <a:t>Develop with Angular and Node “best practices</a:t>
-            </a:r>
-            <a:r>
-              <a:rPr lang="en-US" smtClean="0"/>
-              <a:t>” in mind.</a:t>
-            </a:r>
-            <a:endParaRPr lang="en-US" dirty="0" smtClean="0"/>
-          </a:p>
-          <a:p>
-            <a:endParaRPr lang="en-US" dirty="0"/>
-          </a:p>
-        </p:txBody>
-      </p:sp>
-      <p:sp>
-        <p:nvSpPr>
           <p:cNvPr id="4" name="Date Placeholder 3"/>
           <p:cNvSpPr>
             <a:spLocks noGrp="1"/>
@@ -6321,124 +5951,6 @@
             <a:fld id="{E5FD5434-F838-4DD4-A17B-1CB1A1850DF4}" type="slidenum">
               <a:rPr lang="en-US" smtClean="0"/>
               <a:t>15</a:t>
-            </a:fld>
-            <a:endParaRPr lang="en-US"/>
-          </a:p>
-        </p:txBody>
-      </p:sp>
-    </p:spTree>
-    <p:extLst>
-      <p:ext uri="{BB962C8B-B14F-4D97-AF65-F5344CB8AC3E}">
-        <p14:creationId xmlns:p14="http://schemas.microsoft.com/office/powerpoint/2010/main" val="3259073913"/>
-      </p:ext>
-    </p:extLst>
-  </p:cSld>
-  <p:clrMapOvr>
-    <a:masterClrMapping/>
-  </p:clrMapOvr>
-  <mc:AlternateContent xmlns:mc="http://schemas.openxmlformats.org/markup-compatibility/2006" xmlns:p14="http://schemas.microsoft.com/office/powerpoint/2010/main">
-    <mc:Choice Requires="p14">
-      <p:transition spd="med" p14:dur="700">
-        <p:fade/>
-      </p:transition>
-    </mc:Choice>
-    <mc:Fallback xmlns="">
-      <p:transition spd="med">
-        <p:fade/>
-      </p:transition>
-    </mc:Fallback>
-  </mc:AlternateContent>
-  <p:timing>
-    <p:tnLst>
-      <p:par>
-        <p:cTn id="1" dur="indefinite" restart="never" nodeType="tmRoot"/>
-      </p:par>
-    </p:tnLst>
-  </p:timing>
-</p:sld>
-</file>
-
-<file path=ppt/slides/slide16.xml><?xml version="1.0" encoding="utf-8"?>
-<p:sld xmlns:a="http://schemas.openxmlformats.org/drawingml/2006/main" xmlns:r="http://schemas.openxmlformats.org/officeDocument/2006/relationships" xmlns:p="http://schemas.openxmlformats.org/presentationml/2006/main">
-  <p:cSld>
-    <p:spTree>
-      <p:nvGrpSpPr>
-        <p:cNvPr id="1" name=""/>
-        <p:cNvGrpSpPr/>
-        <p:nvPr/>
-      </p:nvGrpSpPr>
-      <p:grpSpPr>
-        <a:xfrm>
-          <a:off x="0" y="0"/>
-          <a:ext cx="0" cy="0"/>
-          <a:chOff x="0" y="0"/>
-          <a:chExt cx="0" cy="0"/>
-        </a:xfrm>
-      </p:grpSpPr>
-      <p:sp>
-        <p:nvSpPr>
-          <p:cNvPr id="4" name="Date Placeholder 3"/>
-          <p:cNvSpPr>
-            <a:spLocks noGrp="1"/>
-          </p:cNvSpPr>
-          <p:nvPr>
-            <p:ph type="dt" sz="half" idx="10"/>
-          </p:nvPr>
-        </p:nvSpPr>
-        <p:spPr/>
-        <p:txBody>
-          <a:bodyPr/>
-          <a:lstStyle/>
-          <a:p>
-            <a:r>
-              <a:rPr lang="en-US" smtClean="0"/>
-              <a:t>11/10/2015</a:t>
-            </a:r>
-            <a:endParaRPr lang="en-US"/>
-          </a:p>
-        </p:txBody>
-      </p:sp>
-      <p:sp>
-        <p:nvSpPr>
-          <p:cNvPr id="5" name="Footer Placeholder 4"/>
-          <p:cNvSpPr>
-            <a:spLocks noGrp="1"/>
-          </p:cNvSpPr>
-          <p:nvPr>
-            <p:ph type="ftr" sz="quarter" idx="11"/>
-          </p:nvPr>
-        </p:nvSpPr>
-        <p:spPr/>
-        <p:txBody>
-          <a:bodyPr/>
-          <a:lstStyle/>
-          <a:p>
-            <a:r>
-              <a:rPr lang="en-US" smtClean="0"/>
-              <a:t>CS425 Team Hotspotter</a:t>
-            </a:r>
-            <a:endParaRPr lang="en-US"/>
-          </a:p>
-        </p:txBody>
-      </p:sp>
-      <p:sp>
-        <p:nvSpPr>
-          <p:cNvPr id="6" name="Slide Number Placeholder 5"/>
-          <p:cNvSpPr>
-            <a:spLocks noGrp="1"/>
-          </p:cNvSpPr>
-          <p:nvPr>
-            <p:ph type="sldNum" sz="quarter" idx="12"/>
-          </p:nvPr>
-        </p:nvSpPr>
-        <p:spPr/>
-        <p:txBody>
-          <a:bodyPr/>
-          <a:lstStyle/>
-          <a:p>
-            <a:fld id="{E5FD5434-F838-4DD4-A17B-1CB1A1850DF4}" type="slidenum">
-              <a:rPr lang="en-US" smtClean="0"/>
-              <a:t>16</a:t>
             </a:fld>
             <a:endParaRPr lang="en-US"/>
           </a:p>
@@ -7654,212 +7166,6 @@
       </p:grpSpPr>
       <p:sp>
         <p:nvSpPr>
-          <p:cNvPr id="2" name="Title 1"/>
-          <p:cNvSpPr>
-            <a:spLocks noGrp="1"/>
-          </p:cNvSpPr>
-          <p:nvPr>
-            <p:ph type="title"/>
-          </p:nvPr>
-        </p:nvSpPr>
-        <p:spPr/>
-        <p:txBody>
-          <a:bodyPr/>
-          <a:lstStyle/>
-          <a:p>
-            <a:pPr algn="ctr"/>
-            <a:r>
-              <a:rPr lang="en-US" dirty="0" smtClean="0"/>
-              <a:t>Project Plan: Management </a:t>
-            </a:r>
-            <a:r>
-              <a:rPr lang="en-US" sz="2000" i="1" dirty="0" smtClean="0"/>
-              <a:t>(Cont.)</a:t>
-            </a:r>
-            <a:endParaRPr lang="en-US" sz="2000" i="1" dirty="0"/>
-          </a:p>
-        </p:txBody>
-      </p:sp>
-      <p:sp>
-        <p:nvSpPr>
-          <p:cNvPr id="4" name="Date Placeholder 3"/>
-          <p:cNvSpPr>
-            <a:spLocks noGrp="1"/>
-          </p:cNvSpPr>
-          <p:nvPr>
-            <p:ph type="dt" sz="half" idx="10"/>
-          </p:nvPr>
-        </p:nvSpPr>
-        <p:spPr/>
-        <p:txBody>
-          <a:bodyPr/>
-          <a:lstStyle/>
-          <a:p>
-            <a:r>
-              <a:rPr lang="en-US" smtClean="0"/>
-              <a:t>11/10/2015</a:t>
-            </a:r>
-            <a:endParaRPr lang="en-US"/>
-          </a:p>
-        </p:txBody>
-      </p:sp>
-      <p:sp>
-        <p:nvSpPr>
-          <p:cNvPr id="5" name="Footer Placeholder 4"/>
-          <p:cNvSpPr>
-            <a:spLocks noGrp="1"/>
-          </p:cNvSpPr>
-          <p:nvPr>
-            <p:ph type="ftr" sz="quarter" idx="11"/>
-          </p:nvPr>
-        </p:nvSpPr>
-        <p:spPr/>
-        <p:txBody>
-          <a:bodyPr/>
-          <a:lstStyle/>
-          <a:p>
-            <a:r>
-              <a:rPr lang="en-US" smtClean="0"/>
-              <a:t>CS425 Team Hotspotter</a:t>
-            </a:r>
-            <a:endParaRPr lang="en-US"/>
-          </a:p>
-        </p:txBody>
-      </p:sp>
-      <p:sp>
-        <p:nvSpPr>
-          <p:cNvPr id="6" name="Slide Number Placeholder 5"/>
-          <p:cNvSpPr>
-            <a:spLocks noGrp="1"/>
-          </p:cNvSpPr>
-          <p:nvPr>
-            <p:ph type="sldNum" sz="quarter" idx="12"/>
-          </p:nvPr>
-        </p:nvSpPr>
-        <p:spPr/>
-        <p:txBody>
-          <a:bodyPr/>
-          <a:lstStyle/>
-          <a:p>
-            <a:fld id="{E5FD5434-F838-4DD4-A17B-1CB1A1850DF4}" type="slidenum">
-              <a:rPr lang="en-US" smtClean="0"/>
-              <a:t>6</a:t>
-            </a:fld>
-            <a:endParaRPr lang="en-US"/>
-          </a:p>
-        </p:txBody>
-      </p:sp>
-      <p:pic>
-        <p:nvPicPr>
-          <p:cNvPr id="3" name="Picture 2"/>
-          <p:cNvPicPr>
-            <a:picLocks noChangeAspect="1"/>
-          </p:cNvPicPr>
-          <p:nvPr/>
-        </p:nvPicPr>
-        <p:blipFill>
-          <a:blip r:embed="rId2">
-            <a:extLst>
-              <a:ext uri="{28A0092B-C50C-407E-A947-70E740481C1C}">
-                <a14:useLocalDpi xmlns:a14="http://schemas.microsoft.com/office/drawing/2010/main" val="0"/>
-              </a:ext>
-            </a:extLst>
-          </a:blip>
-          <a:stretch>
-            <a:fillRect/>
-          </a:stretch>
-        </p:blipFill>
-        <p:spPr>
-          <a:xfrm>
-            <a:off x="1289806" y="1868846"/>
-            <a:ext cx="9399148" cy="3083864"/>
-          </a:xfrm>
-          <a:prstGeom prst="rect">
-            <a:avLst/>
-          </a:prstGeom>
-        </p:spPr>
-      </p:pic>
-      <p:pic>
-        <p:nvPicPr>
-          <p:cNvPr id="8" name="Picture 7"/>
-          <p:cNvPicPr>
-            <a:picLocks noChangeAspect="1"/>
-          </p:cNvPicPr>
-          <p:nvPr/>
-        </p:nvPicPr>
-        <p:blipFill>
-          <a:blip r:embed="rId3">
-            <a:extLst>
-              <a:ext uri="{28A0092B-C50C-407E-A947-70E740481C1C}">
-                <a14:useLocalDpi xmlns:a14="http://schemas.microsoft.com/office/drawing/2010/main" val="0"/>
-              </a:ext>
-            </a:extLst>
-          </a:blip>
-          <a:stretch>
-            <a:fillRect/>
-          </a:stretch>
-        </p:blipFill>
-        <p:spPr>
-          <a:xfrm>
-            <a:off x="5415891" y="5112024"/>
-            <a:ext cx="1146977" cy="1310831"/>
-          </a:xfrm>
-          <a:prstGeom prst="rect">
-            <a:avLst/>
-          </a:prstGeom>
-        </p:spPr>
-      </p:pic>
-    </p:spTree>
-    <p:extLst>
-      <p:ext uri="{BB962C8B-B14F-4D97-AF65-F5344CB8AC3E}">
-        <p14:creationId xmlns:p14="http://schemas.microsoft.com/office/powerpoint/2010/main" val="1652738565"/>
-      </p:ext>
-    </p:extLst>
-  </p:cSld>
-  <p:clrMapOvr>
-    <a:masterClrMapping/>
-  </p:clrMapOvr>
-  <mc:AlternateContent xmlns:mc="http://schemas.openxmlformats.org/markup-compatibility/2006" xmlns:p14="http://schemas.microsoft.com/office/powerpoint/2010/main">
-    <mc:Choice Requires="p14">
-      <p:transition spd="med" p14:dur="700">
-        <p:fade/>
-      </p:transition>
-    </mc:Choice>
-    <mc:Fallback xmlns="">
-      <p:transition spd="med">
-        <p:fade/>
-      </p:transition>
-    </mc:Fallback>
-  </mc:AlternateContent>
-  <p:timing>
-    <p:tnLst>
-      <p:par>
-        <p:cTn id="1" dur="indefinite" restart="never" nodeType="tmRoot"/>
-      </p:par>
-    </p:tnLst>
-  </p:timing>
-</p:sld>
-</file>
-
-<file path=ppt/slides/slide7.xml><?xml version="1.0" encoding="utf-8"?>
-<p:sld xmlns:a="http://schemas.openxmlformats.org/drawingml/2006/main" xmlns:r="http://schemas.openxmlformats.org/officeDocument/2006/relationships" xmlns:p="http://schemas.openxmlformats.org/presentationml/2006/main">
-  <p:cSld>
-    <p:spTree>
-      <p:nvGrpSpPr>
-        <p:cNvPr id="1" name=""/>
-        <p:cNvGrpSpPr/>
-        <p:nvPr/>
-      </p:nvGrpSpPr>
-      <p:grpSpPr>
-        <a:xfrm>
-          <a:off x="0" y="0"/>
-          <a:ext cx="0" cy="0"/>
-          <a:chOff x="0" y="0"/>
-          <a:chExt cx="0" cy="0"/>
-        </a:xfrm>
-      </p:grpSpPr>
-      <p:sp>
-        <p:nvSpPr>
           <p:cNvPr id="13" name="Title 12"/>
           <p:cNvSpPr>
             <a:spLocks noGrp="1"/>
@@ -8060,7 +7366,7 @@
           <a:p>
             <a:fld id="{E5FD5434-F838-4DD4-A17B-1CB1A1850DF4}" type="slidenum">
               <a:rPr lang="en-US" smtClean="0"/>
-              <a:t>7</a:t>
+              <a:t>6</a:t>
             </a:fld>
             <a:endParaRPr lang="en-US"/>
           </a:p>
@@ -8124,7 +7430,7 @@
 </p:sld>
 </file>
 
-<file path=ppt/slides/slide8.xml><?xml version="1.0" encoding="utf-8"?>
+<file path=ppt/slides/slide7.xml><?xml version="1.0" encoding="utf-8"?>
 <p:sld xmlns:a="http://schemas.openxmlformats.org/drawingml/2006/main" xmlns:r="http://schemas.openxmlformats.org/officeDocument/2006/relationships" xmlns:p="http://schemas.openxmlformats.org/presentationml/2006/main">
   <p:cSld>
     <p:spTree>
@@ -8304,7 +7610,7 @@
           <a:p>
             <a:fld id="{E5FD5434-F838-4DD4-A17B-1CB1A1850DF4}" type="slidenum">
               <a:rPr lang="en-US" smtClean="0"/>
-              <a:t>8</a:t>
+              <a:t>7</a:t>
             </a:fld>
             <a:endParaRPr lang="en-US"/>
           </a:p>
@@ -8368,7 +7674,7 @@
 </p:sld>
 </file>
 
-<file path=ppt/slides/slide9.xml><?xml version="1.0" encoding="utf-8"?>
+<file path=ppt/slides/slide8.xml><?xml version="1.0" encoding="utf-8"?>
 <p:sld xmlns:a="http://schemas.openxmlformats.org/drawingml/2006/main" xmlns:r="http://schemas.openxmlformats.org/officeDocument/2006/relationships" xmlns:p="http://schemas.openxmlformats.org/presentationml/2006/main">
   <p:cSld>
     <p:spTree>
@@ -8478,7 +7784,7 @@
           <a:p>
             <a:fld id="{E5FD5434-F838-4DD4-A17B-1CB1A1850DF4}" type="slidenum">
               <a:rPr lang="en-US" smtClean="0"/>
-              <a:t>9</a:t>
+              <a:t>8</a:t>
             </a:fld>
             <a:endParaRPr lang="en-US"/>
           </a:p>
@@ -8590,6 +7896,493 @@
     </mc:Choice>
     <mc:Fallback xmlns="">
       <p:transition/>
+    </mc:Fallback>
+  </mc:AlternateContent>
+  <p:timing>
+    <p:tnLst>
+      <p:par>
+        <p:cTn id="1" dur="indefinite" restart="never" nodeType="tmRoot"/>
+      </p:par>
+    </p:tnLst>
+  </p:timing>
+</p:sld>
+</file>
+
+<file path=ppt/slides/slide9.xml><?xml version="1.0" encoding="utf-8"?>
+<p:sld xmlns:a="http://schemas.openxmlformats.org/drawingml/2006/main" xmlns:r="http://schemas.openxmlformats.org/officeDocument/2006/relationships" xmlns:p="http://schemas.openxmlformats.org/presentationml/2006/main">
+  <p:cSld>
+    <p:spTree>
+      <p:nvGrpSpPr>
+        <p:cNvPr id="1" name=""/>
+        <p:cNvGrpSpPr/>
+        <p:nvPr/>
+      </p:nvGrpSpPr>
+      <p:grpSpPr>
+        <a:xfrm>
+          <a:off x="0" y="0"/>
+          <a:ext cx="0" cy="0"/>
+          <a:chOff x="0" y="0"/>
+          <a:chExt cx="0" cy="0"/>
+        </a:xfrm>
+      </p:grpSpPr>
+      <p:sp>
+        <p:nvSpPr>
+          <p:cNvPr id="2" name="Title 1"/>
+          <p:cNvSpPr>
+            <a:spLocks noGrp="1"/>
+          </p:cNvSpPr>
+          <p:nvPr>
+            <p:ph type="title"/>
+          </p:nvPr>
+        </p:nvSpPr>
+        <p:spPr/>
+        <p:txBody>
+          <a:bodyPr/>
+          <a:lstStyle/>
+          <a:p>
+            <a:pPr algn="ctr"/>
+            <a:r>
+              <a:rPr lang="en-US" dirty="0" smtClean="0"/>
+              <a:t>Architecture</a:t>
+            </a:r>
+            <a:endParaRPr lang="en-US" dirty="0"/>
+          </a:p>
+        </p:txBody>
+      </p:sp>
+      <p:pic>
+        <p:nvPicPr>
+          <p:cNvPr id="10" name="Picture Placeholder 9"/>
+          <p:cNvPicPr>
+            <a:picLocks noGrp="1" noChangeAspect="1"/>
+          </p:cNvPicPr>
+          <p:nvPr>
+            <p:ph type="pic" idx="1"/>
+          </p:nvPr>
+        </p:nvPicPr>
+        <p:blipFill>
+          <a:blip r:embed="rId2"/>
+          <a:srcRect l="1705" r="1705"/>
+          <a:stretch>
+            <a:fillRect/>
+          </a:stretch>
+        </p:blipFill>
+        <p:spPr>
+          <a:xfrm>
+            <a:off x="379412" y="2528023"/>
+            <a:ext cx="6124885" cy="3931920"/>
+          </a:xfrm>
+          <a:prstGeom prst="rect">
+            <a:avLst/>
+          </a:prstGeom>
+        </p:spPr>
+      </p:pic>
+      <p:sp>
+        <p:nvSpPr>
+          <p:cNvPr id="9" name="Text Placeholder 8"/>
+          <p:cNvSpPr>
+            <a:spLocks noGrp="1"/>
+          </p:cNvSpPr>
+          <p:nvPr>
+            <p:ph type="body" sz="half" idx="2"/>
+          </p:nvPr>
+        </p:nvSpPr>
+        <p:spPr>
+          <a:xfrm>
+            <a:off x="7530746" y="2248446"/>
+            <a:ext cx="3598414" cy="3912445"/>
+          </a:xfrm>
+        </p:spPr>
+        <p:txBody>
+          <a:bodyPr/>
+          <a:lstStyle/>
+          <a:p>
+            <a:pPr algn="ctr"/>
+            <a:r>
+              <a:rPr lang="en-US" sz="3200" u="sng" dirty="0" smtClean="0"/>
+              <a:t>MEAN Tech </a:t>
+            </a:r>
+            <a:r>
+              <a:rPr lang="en-US" sz="3200" u="sng" dirty="0"/>
+              <a:t>S</a:t>
+            </a:r>
+            <a:r>
+              <a:rPr lang="en-US" sz="3200" u="sng" dirty="0" smtClean="0"/>
+              <a:t>tack</a:t>
+            </a:r>
+          </a:p>
+          <a:p>
+            <a:pPr marL="285750" indent="-285750">
+              <a:buFont typeface="Arial" panose="020B0604020202020204" pitchFamily="34" charset="0"/>
+              <a:buChar char="•"/>
+            </a:pPr>
+            <a:endParaRPr lang="en-US" dirty="0"/>
+          </a:p>
+        </p:txBody>
+      </p:sp>
+      <p:sp>
+        <p:nvSpPr>
+          <p:cNvPr id="4" name="Date Placeholder 3"/>
+          <p:cNvSpPr>
+            <a:spLocks noGrp="1"/>
+          </p:cNvSpPr>
+          <p:nvPr>
+            <p:ph type="dt" sz="half" idx="10"/>
+          </p:nvPr>
+        </p:nvSpPr>
+        <p:spPr/>
+        <p:txBody>
+          <a:bodyPr/>
+          <a:lstStyle/>
+          <a:p>
+            <a:r>
+              <a:rPr lang="en-US" smtClean="0"/>
+              <a:t>11/10/2015</a:t>
+            </a:r>
+            <a:endParaRPr lang="en-US"/>
+          </a:p>
+        </p:txBody>
+      </p:sp>
+      <p:sp>
+        <p:nvSpPr>
+          <p:cNvPr id="5" name="Footer Placeholder 4"/>
+          <p:cNvSpPr>
+            <a:spLocks noGrp="1"/>
+          </p:cNvSpPr>
+          <p:nvPr>
+            <p:ph type="ftr" sz="quarter" idx="11"/>
+          </p:nvPr>
+        </p:nvSpPr>
+        <p:spPr/>
+        <p:txBody>
+          <a:bodyPr/>
+          <a:lstStyle/>
+          <a:p>
+            <a:r>
+              <a:rPr lang="en-US" smtClean="0"/>
+              <a:t>CS425 Team Hotspotter</a:t>
+            </a:r>
+            <a:endParaRPr lang="en-US"/>
+          </a:p>
+        </p:txBody>
+      </p:sp>
+      <p:sp>
+        <p:nvSpPr>
+          <p:cNvPr id="6" name="Slide Number Placeholder 5"/>
+          <p:cNvSpPr>
+            <a:spLocks noGrp="1"/>
+          </p:cNvSpPr>
+          <p:nvPr>
+            <p:ph type="sldNum" sz="quarter" idx="12"/>
+          </p:nvPr>
+        </p:nvSpPr>
+        <p:spPr/>
+        <p:txBody>
+          <a:bodyPr/>
+          <a:lstStyle/>
+          <a:p>
+            <a:fld id="{E5FD5434-F838-4DD4-A17B-1CB1A1850DF4}" type="slidenum">
+              <a:rPr lang="en-US" smtClean="0"/>
+              <a:t>9</a:t>
+            </a:fld>
+            <a:endParaRPr lang="en-US"/>
+          </a:p>
+        </p:txBody>
+      </p:sp>
+      <p:pic>
+        <p:nvPicPr>
+          <p:cNvPr id="11" name="Picture 10"/>
+          <p:cNvPicPr>
+            <a:picLocks noChangeAspect="1"/>
+          </p:cNvPicPr>
+          <p:nvPr/>
+        </p:nvPicPr>
+        <p:blipFill>
+          <a:blip r:embed="rId3">
+            <a:extLst>
+              <a:ext uri="{28A0092B-C50C-407E-A947-70E740481C1C}">
+                <a14:useLocalDpi xmlns:a14="http://schemas.microsoft.com/office/drawing/2010/main" val="0"/>
+              </a:ext>
+            </a:extLst>
+          </a:blip>
+          <a:stretch>
+            <a:fillRect/>
+          </a:stretch>
+        </p:blipFill>
+        <p:spPr>
+          <a:xfrm>
+            <a:off x="6789159" y="4716367"/>
+            <a:ext cx="1896897" cy="504679"/>
+          </a:xfrm>
+          <a:prstGeom prst="rect">
+            <a:avLst/>
+          </a:prstGeom>
+        </p:spPr>
+      </p:pic>
+      <p:sp>
+        <p:nvSpPr>
+          <p:cNvPr id="12" name="TextBox 11"/>
+          <p:cNvSpPr txBox="1"/>
+          <p:nvPr/>
+        </p:nvSpPr>
+        <p:spPr>
+          <a:xfrm>
+            <a:off x="8837612" y="4737873"/>
+            <a:ext cx="3112331" cy="461665"/>
+          </a:xfrm>
+          <a:prstGeom prst="rect">
+            <a:avLst/>
+          </a:prstGeom>
+          <a:noFill/>
+        </p:spPr>
+        <p:txBody>
+          <a:bodyPr wrap="square" rtlCol="0">
+            <a:spAutoFit/>
+          </a:bodyPr>
+          <a:lstStyle/>
+          <a:p>
+            <a:r>
+              <a:rPr lang="en-US" dirty="0" smtClean="0"/>
+              <a:t>AngularJS – Client Side</a:t>
+            </a:r>
+            <a:endParaRPr lang="en-US" dirty="0"/>
+          </a:p>
+        </p:txBody>
+      </p:sp>
+      <p:pic>
+        <p:nvPicPr>
+          <p:cNvPr id="13" name="Picture 12"/>
+          <p:cNvPicPr>
+            <a:picLocks noChangeAspect="1"/>
+          </p:cNvPicPr>
+          <p:nvPr/>
+        </p:nvPicPr>
+        <p:blipFill>
+          <a:blip r:embed="rId4">
+            <a:extLst>
+              <a:ext uri="{28A0092B-C50C-407E-A947-70E740481C1C}">
+                <a14:useLocalDpi xmlns:a14="http://schemas.microsoft.com/office/drawing/2010/main" val="0"/>
+              </a:ext>
+            </a:extLst>
+          </a:blip>
+          <a:stretch>
+            <a:fillRect/>
+          </a:stretch>
+        </p:blipFill>
+        <p:spPr>
+          <a:xfrm>
+            <a:off x="6780211" y="3348758"/>
+            <a:ext cx="1881769" cy="554531"/>
+          </a:xfrm>
+          <a:prstGeom prst="rect">
+            <a:avLst/>
+          </a:prstGeom>
+        </p:spPr>
+      </p:pic>
+      <p:sp>
+        <p:nvSpPr>
+          <p:cNvPr id="14" name="TextBox 13"/>
+          <p:cNvSpPr txBox="1"/>
+          <p:nvPr/>
+        </p:nvSpPr>
+        <p:spPr>
+          <a:xfrm>
+            <a:off x="8837612" y="3348758"/>
+            <a:ext cx="2895600" cy="461665"/>
+          </a:xfrm>
+          <a:prstGeom prst="rect">
+            <a:avLst/>
+          </a:prstGeom>
+          <a:noFill/>
+        </p:spPr>
+        <p:txBody>
+          <a:bodyPr wrap="square" rtlCol="0">
+            <a:spAutoFit/>
+          </a:bodyPr>
+          <a:lstStyle/>
+          <a:p>
+            <a:r>
+              <a:rPr lang="en-US" dirty="0" smtClean="0"/>
+              <a:t>MongoDB- Database</a:t>
+            </a:r>
+            <a:endParaRPr lang="en-US" dirty="0"/>
+          </a:p>
+        </p:txBody>
+      </p:sp>
+      <p:pic>
+        <p:nvPicPr>
+          <p:cNvPr id="15" name="Picture 14"/>
+          <p:cNvPicPr>
+            <a:picLocks noChangeAspect="1"/>
+          </p:cNvPicPr>
+          <p:nvPr/>
+        </p:nvPicPr>
+        <p:blipFill>
+          <a:blip r:embed="rId5">
+            <a:extLst>
+              <a:ext uri="{28A0092B-C50C-407E-A947-70E740481C1C}">
+                <a14:useLocalDpi xmlns:a14="http://schemas.microsoft.com/office/drawing/2010/main" val="0"/>
+              </a:ext>
+            </a:extLst>
+          </a:blip>
+          <a:stretch>
+            <a:fillRect/>
+          </a:stretch>
+        </p:blipFill>
+        <p:spPr>
+          <a:xfrm>
+            <a:off x="6789159" y="3990517"/>
+            <a:ext cx="1887949" cy="533400"/>
+          </a:xfrm>
+          <a:prstGeom prst="rect">
+            <a:avLst/>
+          </a:prstGeom>
+        </p:spPr>
+      </p:pic>
+      <p:sp>
+        <p:nvSpPr>
+          <p:cNvPr id="16" name="TextBox 15"/>
+          <p:cNvSpPr txBox="1"/>
+          <p:nvPr/>
+        </p:nvSpPr>
+        <p:spPr>
+          <a:xfrm>
+            <a:off x="8837612" y="3990517"/>
+            <a:ext cx="2819400" cy="461665"/>
+          </a:xfrm>
+          <a:prstGeom prst="rect">
+            <a:avLst/>
+          </a:prstGeom>
+          <a:noFill/>
+        </p:spPr>
+        <p:txBody>
+          <a:bodyPr wrap="square" rtlCol="0">
+            <a:spAutoFit/>
+          </a:bodyPr>
+          <a:lstStyle/>
+          <a:p>
+            <a:r>
+              <a:rPr lang="en-US" dirty="0" smtClean="0"/>
+              <a:t>Express -Middleware</a:t>
+            </a:r>
+            <a:endParaRPr lang="en-US" dirty="0"/>
+          </a:p>
+        </p:txBody>
+      </p:sp>
+      <p:pic>
+        <p:nvPicPr>
+          <p:cNvPr id="18" name="Picture 17"/>
+          <p:cNvPicPr>
+            <a:picLocks noChangeAspect="1"/>
+          </p:cNvPicPr>
+          <p:nvPr/>
+        </p:nvPicPr>
+        <p:blipFill>
+          <a:blip r:embed="rId6">
+            <a:extLst>
+              <a:ext uri="{28A0092B-C50C-407E-A947-70E740481C1C}">
+                <a14:useLocalDpi xmlns:a14="http://schemas.microsoft.com/office/drawing/2010/main" val="0"/>
+              </a:ext>
+            </a:extLst>
+          </a:blip>
+          <a:stretch>
+            <a:fillRect/>
+          </a:stretch>
+        </p:blipFill>
+        <p:spPr>
+          <a:xfrm>
+            <a:off x="6813694" y="5457956"/>
+            <a:ext cx="1872362" cy="605110"/>
+          </a:xfrm>
+          <a:prstGeom prst="rect">
+            <a:avLst/>
+          </a:prstGeom>
+        </p:spPr>
+      </p:pic>
+      <p:sp>
+        <p:nvSpPr>
+          <p:cNvPr id="19" name="TextBox 18"/>
+          <p:cNvSpPr txBox="1"/>
+          <p:nvPr/>
+        </p:nvSpPr>
+        <p:spPr>
+          <a:xfrm>
+            <a:off x="8837612" y="5437262"/>
+            <a:ext cx="2932400" cy="461665"/>
+          </a:xfrm>
+          <a:prstGeom prst="rect">
+            <a:avLst/>
+          </a:prstGeom>
+          <a:noFill/>
+        </p:spPr>
+        <p:txBody>
+          <a:bodyPr wrap="square" rtlCol="0">
+            <a:spAutoFit/>
+          </a:bodyPr>
+          <a:lstStyle/>
+          <a:p>
+            <a:r>
+              <a:rPr lang="en-US" dirty="0" err="1" smtClean="0"/>
+              <a:t>NodeJS</a:t>
+            </a:r>
+            <a:r>
+              <a:rPr lang="en-US" dirty="0" smtClean="0"/>
+              <a:t>- Server Side</a:t>
+            </a:r>
+            <a:endParaRPr lang="en-US" dirty="0"/>
+          </a:p>
+        </p:txBody>
+      </p:sp>
+      <p:sp>
+        <p:nvSpPr>
+          <p:cNvPr id="20" name="TextBox 19"/>
+          <p:cNvSpPr txBox="1"/>
+          <p:nvPr/>
+        </p:nvSpPr>
+        <p:spPr>
+          <a:xfrm>
+            <a:off x="660554" y="1921892"/>
+            <a:ext cx="5562600" cy="461665"/>
+          </a:xfrm>
+          <a:prstGeom prst="rect">
+            <a:avLst/>
+          </a:prstGeom>
+          <a:noFill/>
+        </p:spPr>
+        <p:txBody>
+          <a:bodyPr wrap="square" rtlCol="0">
+            <a:spAutoFit/>
+          </a:bodyPr>
+          <a:lstStyle/>
+          <a:p>
+            <a:pPr algn="ctr"/>
+            <a:r>
+              <a:rPr lang="en-US" dirty="0" smtClean="0"/>
+              <a:t>Client/Server Configuration</a:t>
+            </a:r>
+            <a:endParaRPr lang="en-US" dirty="0"/>
+          </a:p>
+        </p:txBody>
+      </p:sp>
+    </p:spTree>
+    <p:extLst>
+      <p:ext uri="{BB962C8B-B14F-4D97-AF65-F5344CB8AC3E}">
+        <p14:creationId xmlns:p14="http://schemas.microsoft.com/office/powerpoint/2010/main" val="12138330"/>
+      </p:ext>
+    </p:extLst>
+  </p:cSld>
+  <p:clrMapOvr>
+    <a:masterClrMapping/>
+  </p:clrMapOvr>
+  <mc:AlternateContent xmlns:mc="http://schemas.openxmlformats.org/markup-compatibility/2006" xmlns:p14="http://schemas.microsoft.com/office/powerpoint/2010/main">
+    <mc:Choice Requires="p14">
+      <p:transition spd="med" p14:dur="700">
+        <p:fade/>
+      </p:transition>
+    </mc:Choice>
+    <mc:Fallback xmlns="">
+      <p:transition spd="med">
+        <p:fade/>
+      </p:transition>
     </mc:Fallback>
   </mc:AlternateContent>
   <p:timing>

</xml_diff>

<commit_message>
Removed git workflow gif
</commit_message>
<xml_diff>
--- a/Documentation/Presentations/CS425 Final Presentation.pptx
+++ b/Documentation/Presentations/CS425 Final Presentation.pptx
@@ -7616,36 +7616,6 @@
           </a:p>
         </p:txBody>
       </p:sp>
-      <p:pic>
-        <p:nvPicPr>
-          <p:cNvPr id="6" name="Picture 5"/>
-          <p:cNvPicPr>
-            <a:picLocks noChangeAspect="1"/>
-          </p:cNvPicPr>
-          <p:nvPr/>
-        </p:nvPicPr>
-        <p:blipFill>
-          <a:blip r:embed="rId2">
-            <a:extLst>
-              <a:ext uri="{28A0092B-C50C-407E-A947-70E740481C1C}">
-                <a14:useLocalDpi xmlns:a14="http://schemas.microsoft.com/office/drawing/2010/main" val="0"/>
-              </a:ext>
-            </a:extLst>
-          </a:blip>
-          <a:stretch>
-            <a:fillRect/>
-          </a:stretch>
-        </p:blipFill>
-        <p:spPr>
-          <a:xfrm>
-            <a:off x="6856412" y="2057400"/>
-            <a:ext cx="4495800" cy="2448743"/>
-          </a:xfrm>
-          <a:prstGeom prst="rect">
-            <a:avLst/>
-          </a:prstGeom>
-        </p:spPr>
-      </p:pic>
     </p:spTree>
     <p:extLst>
       <p:ext uri="{BB962C8B-B14F-4D97-AF65-F5344CB8AC3E}">

</xml_diff>

<commit_message>
Removed Jenkins auto-build gif
</commit_message>
<xml_diff>
--- a/Documentation/Presentations/CS425 Final Presentation.pptx
+++ b/Documentation/Presentations/CS425 Final Presentation.pptx
@@ -7814,36 +7814,6 @@
           <a:xfrm>
             <a:off x="1324536" y="1847712"/>
             <a:ext cx="3883637" cy="1873384"/>
-          </a:xfrm>
-          <a:prstGeom prst="rect">
-            <a:avLst/>
-          </a:prstGeom>
-        </p:spPr>
-      </p:pic>
-      <p:pic>
-        <p:nvPicPr>
-          <p:cNvPr id="10" name="Picture 9"/>
-          <p:cNvPicPr>
-            <a:picLocks noChangeAspect="1"/>
-          </p:cNvPicPr>
-          <p:nvPr/>
-        </p:nvPicPr>
-        <p:blipFill>
-          <a:blip r:embed="rId4">
-            <a:extLst>
-              <a:ext uri="{28A0092B-C50C-407E-A947-70E740481C1C}">
-                <a14:useLocalDpi xmlns:a14="http://schemas.microsoft.com/office/drawing/2010/main" val="0"/>
-              </a:ext>
-            </a:extLst>
-          </a:blip>
-          <a:stretch>
-            <a:fillRect/>
-          </a:stretch>
-        </p:blipFill>
-        <p:spPr>
-          <a:xfrm>
-            <a:off x="6551612" y="1847712"/>
-            <a:ext cx="5309646" cy="4609534"/>
           </a:xfrm>
           <a:prstGeom prst="rect">
             <a:avLst/>

</xml_diff>

<commit_message>
Increased font size on all footers
</commit_message>
<xml_diff>
--- a/Documentation/Presentations/CS425 Final Presentation.pptx
+++ b/Documentation/Presentations/CS425 Final Presentation.pptx
@@ -4988,10 +4988,10 @@
           <a:lstStyle/>
           <a:p>
             <a:r>
-              <a:rPr lang="en-US" smtClean="0"/>
-              <a:t>11/10/2015</a:t>
-            </a:r>
-            <a:endParaRPr lang="en-US"/>
+              <a:rPr lang="en-US" sz="1200" dirty="0" smtClean="0"/>
+              <a:t>11/16/2015</a:t>
+            </a:r>
+            <a:endParaRPr lang="en-US" dirty="0"/>
           </a:p>
         </p:txBody>
       </p:sp>
@@ -5011,10 +5011,14 @@
           <a:lstStyle/>
           <a:p>
             <a:r>
-              <a:rPr lang="en-US" smtClean="0"/>
-              <a:t>CS425 Team Hotspotter</a:t>
-            </a:r>
-            <a:endParaRPr lang="en-US"/>
+              <a:rPr lang="en-US" sz="1200" dirty="0" smtClean="0"/>
+              <a:t>CS425 Team </a:t>
+            </a:r>
+            <a:r>
+              <a:rPr lang="en-US" sz="1200" dirty="0" err="1" smtClean="0"/>
+              <a:t>Hotspotter</a:t>
+            </a:r>
+            <a:endParaRPr lang="en-US" sz="1200" dirty="0"/>
           </a:p>
         </p:txBody>
       </p:sp>
@@ -5037,7 +5041,7 @@
               <a:rPr lang="en-US" smtClean="0"/>
               <a:t>10</a:t>
             </a:fld>
-            <a:endParaRPr lang="en-US"/>
+            <a:endParaRPr lang="en-US" dirty="0"/>
           </a:p>
         </p:txBody>
       </p:sp>
@@ -5168,10 +5172,10 @@
           <a:lstStyle/>
           <a:p>
             <a:r>
-              <a:rPr lang="en-US" smtClean="0"/>
-              <a:t>11/10/2015</a:t>
-            </a:r>
-            <a:endParaRPr lang="en-US"/>
+              <a:rPr lang="en-US" sz="1200" dirty="0" smtClean="0"/>
+              <a:t>11/16/2015</a:t>
+            </a:r>
+            <a:endParaRPr lang="en-US" dirty="0"/>
           </a:p>
         </p:txBody>
       </p:sp>
@@ -5191,10 +5195,14 @@
           <a:lstStyle/>
           <a:p>
             <a:r>
-              <a:rPr lang="en-US" smtClean="0"/>
-              <a:t>CS425 Team Hotspotter</a:t>
-            </a:r>
-            <a:endParaRPr lang="en-US"/>
+              <a:rPr lang="en-US" sz="1200" dirty="0" smtClean="0"/>
+              <a:t>CS425 Team </a:t>
+            </a:r>
+            <a:r>
+              <a:rPr lang="en-US" sz="1200" dirty="0" err="1" smtClean="0"/>
+              <a:t>Hotspotter</a:t>
+            </a:r>
+            <a:endParaRPr lang="en-US" sz="1200" dirty="0"/>
           </a:p>
         </p:txBody>
       </p:sp>
@@ -5365,10 +5373,10 @@
           <a:lstStyle/>
           <a:p>
             <a:r>
-              <a:rPr lang="en-US" smtClean="0"/>
-              <a:t>11/10/2015</a:t>
-            </a:r>
-            <a:endParaRPr lang="en-US"/>
+              <a:rPr lang="en-US" sz="1200" dirty="0" smtClean="0"/>
+              <a:t>11/16/2015</a:t>
+            </a:r>
+            <a:endParaRPr lang="en-US" sz="1200" dirty="0"/>
           </a:p>
         </p:txBody>
       </p:sp>
@@ -5388,10 +5396,14 @@
           <a:lstStyle/>
           <a:p>
             <a:r>
-              <a:rPr lang="en-US" smtClean="0"/>
-              <a:t>CS425 Team Hotspotter</a:t>
-            </a:r>
-            <a:endParaRPr lang="en-US"/>
+              <a:rPr lang="en-US" sz="1200" dirty="0" smtClean="0"/>
+              <a:t>CS425 Team </a:t>
+            </a:r>
+            <a:r>
+              <a:rPr lang="en-US" sz="1200" dirty="0" err="1" smtClean="0"/>
+              <a:t>Hotspotter</a:t>
+            </a:r>
+            <a:endParaRPr lang="en-US" sz="1200" dirty="0"/>
           </a:p>
         </p:txBody>
       </p:sp>
@@ -5584,10 +5596,10 @@
           <a:lstStyle/>
           <a:p>
             <a:r>
-              <a:rPr lang="en-US" smtClean="0"/>
-              <a:t>11/10/2015</a:t>
-            </a:r>
-            <a:endParaRPr lang="en-US"/>
+              <a:rPr lang="en-US" sz="1200" dirty="0" smtClean="0"/>
+              <a:t>11/16/2015</a:t>
+            </a:r>
+            <a:endParaRPr lang="en-US" sz="1200" dirty="0"/>
           </a:p>
         </p:txBody>
       </p:sp>
@@ -5607,10 +5619,14 @@
           <a:lstStyle/>
           <a:p>
             <a:r>
-              <a:rPr lang="en-US" smtClean="0"/>
-              <a:t>CS425 Team Hotspotter</a:t>
-            </a:r>
-            <a:endParaRPr lang="en-US"/>
+              <a:rPr lang="en-US" sz="1200" dirty="0" smtClean="0"/>
+              <a:t>CS425 Team </a:t>
+            </a:r>
+            <a:r>
+              <a:rPr lang="en-US" sz="1200" dirty="0" err="1" smtClean="0"/>
+              <a:t>Hotspotter</a:t>
+            </a:r>
+            <a:endParaRPr lang="en-US" sz="1200" dirty="0"/>
           </a:p>
         </p:txBody>
       </p:sp>
@@ -5785,10 +5801,10 @@
           <a:lstStyle/>
           <a:p>
             <a:r>
-              <a:rPr lang="en-US" smtClean="0"/>
-              <a:t>11/10/2015</a:t>
-            </a:r>
-            <a:endParaRPr lang="en-US"/>
+              <a:rPr lang="en-US" sz="1200" dirty="0" smtClean="0"/>
+              <a:t>11/16/2015</a:t>
+            </a:r>
+            <a:endParaRPr lang="en-US" sz="1200" dirty="0"/>
           </a:p>
         </p:txBody>
       </p:sp>
@@ -5808,10 +5824,14 @@
           <a:lstStyle/>
           <a:p>
             <a:r>
-              <a:rPr lang="en-US" smtClean="0"/>
-              <a:t>CS425 Team Hotspotter</a:t>
-            </a:r>
-            <a:endParaRPr lang="en-US"/>
+              <a:rPr lang="en-US" sz="1200" dirty="0" smtClean="0"/>
+              <a:t>CS425 Team </a:t>
+            </a:r>
+            <a:r>
+              <a:rPr lang="en-US" sz="1200" dirty="0" err="1" smtClean="0"/>
+              <a:t>Hotspotter</a:t>
+            </a:r>
+            <a:endParaRPr lang="en-US" sz="1200" dirty="0"/>
           </a:p>
         </p:txBody>
       </p:sp>
@@ -5903,10 +5923,10 @@
           <a:lstStyle/>
           <a:p>
             <a:r>
-              <a:rPr lang="en-US" smtClean="0"/>
-              <a:t>11/10/2015</a:t>
-            </a:r>
-            <a:endParaRPr lang="en-US"/>
+              <a:rPr lang="en-US" sz="1200" dirty="0" smtClean="0"/>
+              <a:t>11/16/2015</a:t>
+            </a:r>
+            <a:endParaRPr lang="en-US" sz="1200" dirty="0"/>
           </a:p>
         </p:txBody>
       </p:sp>
@@ -5926,10 +5946,14 @@
           <a:lstStyle/>
           <a:p>
             <a:r>
-              <a:rPr lang="en-US" smtClean="0"/>
-              <a:t>CS425 Team Hotspotter</a:t>
-            </a:r>
-            <a:endParaRPr lang="en-US"/>
+              <a:rPr lang="en-US" sz="1200" dirty="0" smtClean="0"/>
+              <a:t>CS425 Team </a:t>
+            </a:r>
+            <a:r>
+              <a:rPr lang="en-US" sz="1200" dirty="0" err="1" smtClean="0"/>
+              <a:t>Hotspotter</a:t>
+            </a:r>
+            <a:endParaRPr lang="en-US" sz="1200" dirty="0"/>
           </a:p>
         </p:txBody>
       </p:sp>
@@ -5952,7 +5976,7 @@
               <a:rPr lang="en-US" smtClean="0"/>
               <a:t>15</a:t>
             </a:fld>
-            <a:endParaRPr lang="en-US"/>
+            <a:endParaRPr lang="en-US" dirty="0"/>
           </a:p>
         </p:txBody>
       </p:sp>
@@ -6212,10 +6236,10 @@
           <a:lstStyle/>
           <a:p>
             <a:r>
-              <a:rPr lang="en-US" smtClean="0"/>
-              <a:t>11/10/2015</a:t>
-            </a:r>
-            <a:endParaRPr lang="en-US"/>
+              <a:rPr lang="en-US" sz="1200" dirty="0" smtClean="0"/>
+              <a:t>11/16/2015</a:t>
+            </a:r>
+            <a:endParaRPr lang="en-US" dirty="0"/>
           </a:p>
         </p:txBody>
       </p:sp>
@@ -6235,10 +6259,14 @@
           <a:lstStyle/>
           <a:p>
             <a:r>
-              <a:rPr lang="en-US" smtClean="0"/>
-              <a:t>CS425 Team Hotspotter</a:t>
-            </a:r>
-            <a:endParaRPr lang="en-US"/>
+              <a:rPr lang="en-US" sz="1200" dirty="0" smtClean="0"/>
+              <a:t>CS425 Team </a:t>
+            </a:r>
+            <a:r>
+              <a:rPr lang="en-US" sz="1200" dirty="0" err="1" smtClean="0"/>
+              <a:t>Hotspotter</a:t>
+            </a:r>
+            <a:endParaRPr lang="en-US" sz="1200" dirty="0"/>
           </a:p>
         </p:txBody>
       </p:sp>
@@ -6258,10 +6286,10 @@
           <a:lstStyle/>
           <a:p>
             <a:fld id="{E5FD5434-F838-4DD4-A17B-1CB1A1850DF4}" type="slidenum">
-              <a:rPr lang="en-US" smtClean="0"/>
+              <a:rPr lang="en-US" sz="1600" smtClean="0"/>
               <a:t>2</a:t>
             </a:fld>
-            <a:endParaRPr lang="en-US"/>
+            <a:endParaRPr lang="en-US" sz="1600" dirty="0"/>
           </a:p>
         </p:txBody>
       </p:sp>
@@ -6468,10 +6496,10 @@
           <a:lstStyle/>
           <a:p>
             <a:r>
-              <a:rPr lang="en-US" smtClean="0"/>
-              <a:t>11/10/2015</a:t>
-            </a:r>
-            <a:endParaRPr lang="en-US"/>
+              <a:rPr lang="en-US" sz="1200" dirty="0" smtClean="0"/>
+              <a:t>11/16/2015</a:t>
+            </a:r>
+            <a:endParaRPr lang="en-US" sz="1200" dirty="0"/>
           </a:p>
         </p:txBody>
       </p:sp>
@@ -6491,10 +6519,14 @@
           <a:lstStyle/>
           <a:p>
             <a:r>
-              <a:rPr lang="en-US" smtClean="0"/>
-              <a:t>CS425 Team Hotspotter</a:t>
-            </a:r>
-            <a:endParaRPr lang="en-US"/>
+              <a:rPr lang="en-US" sz="1200" dirty="0" smtClean="0"/>
+              <a:t>CS425 Team </a:t>
+            </a:r>
+            <a:r>
+              <a:rPr lang="en-US" sz="1200" dirty="0" err="1" smtClean="0"/>
+              <a:t>Hotspotter</a:t>
+            </a:r>
+            <a:endParaRPr lang="en-US" sz="1200" dirty="0"/>
           </a:p>
         </p:txBody>
       </p:sp>
@@ -6517,7 +6549,7 @@
               <a:rPr lang="en-US" smtClean="0"/>
               <a:t>3</a:t>
             </a:fld>
-            <a:endParaRPr lang="en-US"/>
+            <a:endParaRPr lang="en-US" dirty="0"/>
           </a:p>
         </p:txBody>
       </p:sp>
@@ -6670,10 +6702,10 @@
           <a:lstStyle/>
           <a:p>
             <a:r>
-              <a:rPr lang="en-US" smtClean="0"/>
-              <a:t>11/10/2015</a:t>
-            </a:r>
-            <a:endParaRPr lang="en-US"/>
+              <a:rPr lang="en-US" sz="1200" dirty="0" smtClean="0"/>
+              <a:t>11/16/2015</a:t>
+            </a:r>
+            <a:endParaRPr lang="en-US" dirty="0"/>
           </a:p>
         </p:txBody>
       </p:sp>
@@ -6984,10 +7016,10 @@
           <a:lstStyle/>
           <a:p>
             <a:r>
-              <a:rPr lang="en-US" smtClean="0"/>
-              <a:t>11/10/2015</a:t>
-            </a:r>
-            <a:endParaRPr lang="en-US"/>
+              <a:rPr lang="en-US" sz="1200" dirty="0" smtClean="0"/>
+              <a:t>11/16/2015</a:t>
+            </a:r>
+            <a:endParaRPr lang="en-US" sz="1200" dirty="0"/>
           </a:p>
         </p:txBody>
       </p:sp>
@@ -7007,10 +7039,14 @@
           <a:lstStyle/>
           <a:p>
             <a:r>
-              <a:rPr lang="en-US" smtClean="0"/>
-              <a:t>CS425 Team Hotspotter</a:t>
-            </a:r>
-            <a:endParaRPr lang="en-US"/>
+              <a:rPr lang="en-US" sz="1200" dirty="0" smtClean="0"/>
+              <a:t>CS425 Team </a:t>
+            </a:r>
+            <a:r>
+              <a:rPr lang="en-US" sz="1200" dirty="0" err="1" smtClean="0"/>
+              <a:t>Hotspotter</a:t>
+            </a:r>
+            <a:endParaRPr lang="en-US" sz="1200" dirty="0"/>
           </a:p>
         </p:txBody>
       </p:sp>
@@ -7319,10 +7355,10 @@
           <a:lstStyle/>
           <a:p>
             <a:r>
-              <a:rPr lang="en-US" smtClean="0"/>
-              <a:t>11/10/2015</a:t>
-            </a:r>
-            <a:endParaRPr lang="en-US"/>
+              <a:rPr lang="en-US" sz="1200" dirty="0" smtClean="0"/>
+              <a:t>11/16/2015</a:t>
+            </a:r>
+            <a:endParaRPr lang="en-US" sz="1200" dirty="0"/>
           </a:p>
         </p:txBody>
       </p:sp>
@@ -7342,10 +7378,14 @@
           <a:lstStyle/>
           <a:p>
             <a:r>
-              <a:rPr lang="en-US" smtClean="0"/>
-              <a:t>CS425 Team Hotspotter</a:t>
-            </a:r>
-            <a:endParaRPr lang="en-US"/>
+              <a:rPr lang="en-US" sz="1200" dirty="0" smtClean="0"/>
+              <a:t>CS425 Team </a:t>
+            </a:r>
+            <a:r>
+              <a:rPr lang="en-US" sz="1200" dirty="0" err="1" smtClean="0"/>
+              <a:t>Hotspotter</a:t>
+            </a:r>
+            <a:endParaRPr lang="en-US" sz="1200" dirty="0"/>
           </a:p>
         </p:txBody>
       </p:sp>
@@ -7368,7 +7408,7 @@
               <a:rPr lang="en-US" smtClean="0"/>
               <a:t>6</a:t>
             </a:fld>
-            <a:endParaRPr lang="en-US"/>
+            <a:endParaRPr lang="en-US" dirty="0"/>
           </a:p>
         </p:txBody>
       </p:sp>
@@ -7563,10 +7603,10 @@
           <a:lstStyle/>
           <a:p>
             <a:r>
-              <a:rPr lang="en-US" smtClean="0"/>
-              <a:t>11/10/2015</a:t>
-            </a:r>
-            <a:endParaRPr lang="en-US"/>
+              <a:rPr lang="en-US" sz="1200" dirty="0" smtClean="0"/>
+              <a:t>11/16/2015</a:t>
+            </a:r>
+            <a:endParaRPr lang="en-US" sz="1200" dirty="0"/>
           </a:p>
         </p:txBody>
       </p:sp>
@@ -7586,10 +7626,14 @@
           <a:lstStyle/>
           <a:p>
             <a:r>
-              <a:rPr lang="en-US" smtClean="0"/>
-              <a:t>CS425 Team Hotspotter</a:t>
-            </a:r>
-            <a:endParaRPr lang="en-US"/>
+              <a:rPr lang="en-US" sz="1200" dirty="0" smtClean="0"/>
+              <a:t>CS425 Team </a:t>
+            </a:r>
+            <a:r>
+              <a:rPr lang="en-US" sz="1200" dirty="0" err="1" smtClean="0"/>
+              <a:t>Hotspotter</a:t>
+            </a:r>
+            <a:endParaRPr lang="en-US" sz="1200" dirty="0"/>
           </a:p>
         </p:txBody>
       </p:sp>
@@ -7707,10 +7751,10 @@
           <a:lstStyle/>
           <a:p>
             <a:r>
-              <a:rPr lang="en-US" smtClean="0"/>
-              <a:t>11/10/2015</a:t>
-            </a:r>
-            <a:endParaRPr lang="en-US"/>
+              <a:rPr lang="en-US" sz="1200" dirty="0" smtClean="0"/>
+              <a:t>11/16/2015</a:t>
+            </a:r>
+            <a:endParaRPr lang="en-US" sz="1200" dirty="0"/>
           </a:p>
         </p:txBody>
       </p:sp>
@@ -7730,10 +7774,14 @@
           <a:lstStyle/>
           <a:p>
             <a:r>
-              <a:rPr lang="en-US" smtClean="0"/>
-              <a:t>CS425 Team Hotspotter</a:t>
-            </a:r>
-            <a:endParaRPr lang="en-US"/>
+              <a:rPr lang="en-US" sz="1200" dirty="0" smtClean="0"/>
+              <a:t>CS425 Team </a:t>
+            </a:r>
+            <a:r>
+              <a:rPr lang="en-US" sz="1200" dirty="0" err="1" smtClean="0"/>
+              <a:t>Hotspotter</a:t>
+            </a:r>
+            <a:endParaRPr lang="en-US" sz="1200" dirty="0"/>
           </a:p>
         </p:txBody>
       </p:sp>
@@ -7782,8 +7830,8 @@
         </p:blipFill>
         <p:spPr>
           <a:xfrm>
-            <a:off x="1324536" y="3731442"/>
-            <a:ext cx="9184472" cy="2704225"/>
+            <a:off x="6592910" y="2362200"/>
+            <a:ext cx="5033947" cy="3505200"/>
           </a:xfrm>
           <a:prstGeom prst="rect">
             <a:avLst/>
@@ -7812,8 +7860,8 @@
         </p:blipFill>
         <p:spPr>
           <a:xfrm>
-            <a:off x="1324536" y="1847712"/>
-            <a:ext cx="3883637" cy="1873384"/>
+            <a:off x="989012" y="2362200"/>
+            <a:ext cx="5345741" cy="2578672"/>
           </a:xfrm>
           <a:prstGeom prst="rect">
             <a:avLst/>
@@ -7975,10 +8023,10 @@
           <a:lstStyle/>
           <a:p>
             <a:r>
-              <a:rPr lang="en-US" smtClean="0"/>
-              <a:t>11/10/2015</a:t>
-            </a:r>
-            <a:endParaRPr lang="en-US"/>
+              <a:rPr lang="en-US" sz="1200" dirty="0" smtClean="0"/>
+              <a:t>11/16/2015</a:t>
+            </a:r>
+            <a:endParaRPr lang="en-US" sz="1200" dirty="0"/>
           </a:p>
         </p:txBody>
       </p:sp>
@@ -7998,10 +8046,14 @@
           <a:lstStyle/>
           <a:p>
             <a:r>
-              <a:rPr lang="en-US" smtClean="0"/>
-              <a:t>CS425 Team Hotspotter</a:t>
-            </a:r>
-            <a:endParaRPr lang="en-US"/>
+              <a:rPr lang="en-US" sz="1200" dirty="0" smtClean="0"/>
+              <a:t>CS425 Team </a:t>
+            </a:r>
+            <a:r>
+              <a:rPr lang="en-US" sz="1200" dirty="0" err="1" smtClean="0"/>
+              <a:t>Hotspotter</a:t>
+            </a:r>
+            <a:endParaRPr lang="en-US" sz="1200" dirty="0"/>
           </a:p>
         </p:txBody>
       </p:sp>

</xml_diff>

<commit_message>
Resized images, edited Quality slide bullets
</commit_message>
<xml_diff>
--- a/Documentation/Presentations/CS425 Final Presentation.pptx
+++ b/Documentation/Presentations/CS425 Final Presentation.pptx
@@ -4932,7 +4932,11 @@
             <a:pPr algn="ctr"/>
             <a:r>
               <a:rPr lang="en-US" dirty="0" smtClean="0"/>
-              <a:t>Efforts &amp;Deliverables</a:t>
+              <a:t>Efforts </a:t>
+            </a:r>
+            <a:r>
+              <a:rPr lang="en-US" dirty="0" smtClean="0"/>
+              <a:t>&amp; Deliverables</a:t>
             </a:r>
             <a:endParaRPr lang="en-US" dirty="0"/>
           </a:p>
@@ -5112,11 +5116,19 @@
             <a:pPr algn="ctr"/>
             <a:r>
               <a:rPr lang="en-US" dirty="0" smtClean="0"/>
-              <a:t>Efforts &amp;Deliverables</a:t>
+              <a:t>Efforts </a:t>
+            </a:r>
+            <a:r>
+              <a:rPr lang="en-US" dirty="0" smtClean="0"/>
+              <a:t>&amp; Deliverables</a:t>
             </a:r>
             <a:r>
               <a:rPr lang="en-US" sz="2000" i="1" dirty="0" smtClean="0"/>
-              <a:t>(cont.)</a:t>
+              <a:t>(cont</a:t>
+            </a:r>
+            <a:r>
+              <a:rPr lang="en-US" sz="2000" i="1" dirty="0" smtClean="0"/>
+              <a:t>.)</a:t>
             </a:r>
             <a:endParaRPr lang="en-US" sz="2000" i="1" dirty="0"/>
           </a:p>
@@ -6725,10 +6737,14 @@
           <a:lstStyle/>
           <a:p>
             <a:r>
-              <a:rPr lang="en-US" smtClean="0"/>
-              <a:t>CS425 Team Hotspotter</a:t>
-            </a:r>
-            <a:endParaRPr lang="en-US"/>
+              <a:rPr lang="en-US" sz="1200" dirty="0" smtClean="0"/>
+              <a:t>CS425 Team </a:t>
+            </a:r>
+            <a:r>
+              <a:rPr lang="en-US" sz="1200" dirty="0" err="1" smtClean="0"/>
+              <a:t>Hotspotter</a:t>
+            </a:r>
+            <a:endParaRPr lang="en-US" sz="1200" dirty="0"/>
           </a:p>
         </p:txBody>
       </p:sp>
@@ -7414,28 +7430,22 @@
       </p:sp>
       <p:pic>
         <p:nvPicPr>
-          <p:cNvPr id="5" name="Picture 4"/>
+          <p:cNvPr id="6" name="Picture 5"/>
           <p:cNvPicPr>
             <a:picLocks noChangeAspect="1"/>
           </p:cNvPicPr>
           <p:nvPr/>
         </p:nvPicPr>
         <p:blipFill>
-          <a:blip r:embed="rId3">
-            <a:extLst>
-              <a:ext uri="{28A0092B-C50C-407E-A947-70E740481C1C}">
-                <a14:useLocalDpi xmlns:a14="http://schemas.microsoft.com/office/drawing/2010/main" val="0"/>
-              </a:ext>
-            </a:extLst>
-          </a:blip>
+          <a:blip r:embed="rId3"/>
           <a:stretch>
             <a:fillRect/>
           </a:stretch>
         </p:blipFill>
         <p:spPr>
           <a:xfrm>
-            <a:off x="7389812" y="1905000"/>
-            <a:ext cx="4563373" cy="4574882"/>
+            <a:off x="7045878" y="2041561"/>
+            <a:ext cx="4876800" cy="4219575"/>
           </a:xfrm>
           <a:prstGeom prst="rect">
             <a:avLst/>
@@ -7507,7 +7517,7 @@
             <a:pPr algn="ctr"/>
             <a:r>
               <a:rPr lang="en-US" sz="4400" dirty="0" smtClean="0"/>
-              <a:t>Project plan: Quality &amp;Tests</a:t>
+              <a:t>QUALITY ASSURANCE</a:t>
             </a:r>
             <a:endParaRPr lang="en-US" sz="4400" dirty="0"/>
           </a:p>
@@ -7545,45 +7555,68 @@
             <a:pPr lvl="1"/>
             <a:r>
               <a:rPr lang="en-US" sz="2800" dirty="0" smtClean="0"/>
-              <a:t>We defined a </a:t>
-            </a:r>
-            <a:r>
-              <a:rPr lang="en-US" sz="2800" dirty="0"/>
-              <a:t>G</a:t>
+              <a:t>Well-defined </a:t>
+            </a:r>
+            <a:r>
+              <a:rPr lang="en-US" sz="2800" dirty="0" err="1" smtClean="0"/>
+              <a:t>git</a:t>
             </a:r>
             <a:r>
               <a:rPr lang="en-US" sz="2800" dirty="0" smtClean="0"/>
-              <a:t>it process to maintain consistency </a:t>
-            </a:r>
-            <a:endParaRPr lang="en-US" sz="2800" dirty="0"/>
-          </a:p>
-          <a:p>
-            <a:r>
-              <a:rPr lang="en-US" sz="2800" dirty="0" err="1" smtClean="0"/>
-              <a:t>Bitbucket</a:t>
+              <a:t> workflow </a:t>
+            </a:r>
+            <a:r>
+              <a:rPr lang="en-US" sz="2800" dirty="0" smtClean="0"/>
+              <a:t>to maintain consistency </a:t>
             </a:r>
             <a:endParaRPr lang="en-US" sz="2800" dirty="0" smtClean="0"/>
           </a:p>
           <a:p>
-            <a:pPr lvl="1"/>
-            <a:r>
-              <a:rPr lang="en-US" sz="2800" dirty="0" smtClean="0"/>
-              <a:t>Pull requests</a:t>
-            </a:r>
-          </a:p>
-          <a:p>
-            <a:pPr lvl="1"/>
-            <a:r>
-              <a:rPr lang="en-US" sz="2800" dirty="0" smtClean="0"/>
-              <a:t>Full Team Approval</a:t>
-            </a:r>
-          </a:p>
-          <a:p>
             <a:pPr lvl="2"/>
             <a:r>
-              <a:rPr lang="en-US" sz="2800" dirty="0" smtClean="0"/>
-              <a:t>Comments on code segments that might have conflicts or opinions</a:t>
-            </a:r>
+              <a:rPr lang="en-US" sz="2600" dirty="0" smtClean="0"/>
+              <a:t>Pull Locally</a:t>
+            </a:r>
+          </a:p>
+          <a:p>
+            <a:pPr lvl="2"/>
+            <a:r>
+              <a:rPr lang="en-US" sz="2600" dirty="0" smtClean="0"/>
+              <a:t>Branch</a:t>
+            </a:r>
+          </a:p>
+          <a:p>
+            <a:pPr lvl="2"/>
+            <a:r>
+              <a:rPr lang="en-US" sz="2600" dirty="0" smtClean="0"/>
+              <a:t>Commit Often</a:t>
+            </a:r>
+          </a:p>
+          <a:p>
+            <a:pPr lvl="2"/>
+            <a:r>
+              <a:rPr lang="en-US" sz="2600" dirty="0" smtClean="0"/>
+              <a:t>Push</a:t>
+            </a:r>
+          </a:p>
+          <a:p>
+            <a:pPr lvl="2"/>
+            <a:r>
+              <a:rPr lang="en-US" sz="2600" dirty="0" smtClean="0"/>
+              <a:t>Pul</a:t>
+            </a:r>
+            <a:r>
+              <a:rPr lang="en-US" sz="2600" dirty="0" smtClean="0"/>
+              <a:t>l Request</a:t>
+            </a:r>
+          </a:p>
+          <a:p>
+            <a:pPr lvl="2"/>
+            <a:r>
+              <a:rPr lang="en-US" sz="2600" dirty="0" smtClean="0"/>
+              <a:t>Merge to Master</a:t>
+            </a:r>
+            <a:endParaRPr lang="en-US" sz="2600" dirty="0" smtClean="0"/>
           </a:p>
         </p:txBody>
       </p:sp>
@@ -7657,6 +7690,283 @@
               <a:t>7</a:t>
             </a:fld>
             <a:endParaRPr lang="en-US"/>
+          </a:p>
+        </p:txBody>
+      </p:sp>
+      <p:sp>
+        <p:nvSpPr>
+          <p:cNvPr id="9" name="Content Placeholder 13"/>
+          <p:cNvSpPr txBox="1">
+            <a:spLocks/>
+          </p:cNvSpPr>
+          <p:nvPr/>
+        </p:nvSpPr>
+        <p:spPr>
+          <a:xfrm>
+            <a:off x="6093372" y="2021633"/>
+            <a:ext cx="5914506" cy="4206240"/>
+          </a:xfrm>
+          <a:prstGeom prst="rect">
+            <a:avLst/>
+          </a:prstGeom>
+        </p:spPr>
+        <p:txBody>
+          <a:bodyPr vert="horz" lIns="91440" tIns="45720" rIns="91440" bIns="45720" rtlCol="0">
+            <a:noAutofit/>
+          </a:bodyPr>
+          <a:lstStyle>
+            <a:lvl1pPr marL="182825" indent="-182825" algn="l" defTabSz="914126" rtl="0" eaLnBrk="1" latinLnBrk="0" hangingPunct="1">
+              <a:lnSpc>
+                <a:spcPct val="90000"/>
+              </a:lnSpc>
+              <a:spcBef>
+                <a:spcPts val="1200"/>
+              </a:spcBef>
+              <a:spcAft>
+                <a:spcPts val="200"/>
+              </a:spcAft>
+              <a:buClr>
+                <a:schemeClr val="tx1"/>
+              </a:buClr>
+              <a:buFont typeface="Wingdings" pitchFamily="2" charset="2"/>
+              <a:buChar char=""/>
+              <a:defRPr sz="2199" kern="1200">
+                <a:solidFill>
+                  <a:schemeClr val="tx1"/>
+                </a:solidFill>
+                <a:latin typeface="+mn-lt"/>
+                <a:ea typeface="+mn-ea"/>
+                <a:cs typeface="+mn-cs"/>
+              </a:defRPr>
+            </a:lvl1pPr>
+            <a:lvl2pPr marL="411357" indent="-182825" algn="l" defTabSz="914126" rtl="0" eaLnBrk="1" latinLnBrk="0" hangingPunct="1">
+              <a:lnSpc>
+                <a:spcPct val="90000"/>
+              </a:lnSpc>
+              <a:spcBef>
+                <a:spcPts val="200"/>
+              </a:spcBef>
+              <a:spcAft>
+                <a:spcPts val="400"/>
+              </a:spcAft>
+              <a:buClr>
+                <a:schemeClr val="tx1"/>
+              </a:buClr>
+              <a:buFont typeface="Wingdings" pitchFamily="2" charset="2"/>
+              <a:buChar char=""/>
+              <a:defRPr sz="1999" kern="1200">
+                <a:solidFill>
+                  <a:schemeClr val="tx1"/>
+                </a:solidFill>
+                <a:latin typeface="+mn-lt"/>
+                <a:ea typeface="+mn-ea"/>
+                <a:cs typeface="+mn-cs"/>
+              </a:defRPr>
+            </a:lvl2pPr>
+            <a:lvl3pPr marL="639888" indent="-182825" algn="l" defTabSz="914126" rtl="0" eaLnBrk="1" latinLnBrk="0" hangingPunct="1">
+              <a:lnSpc>
+                <a:spcPct val="90000"/>
+              </a:lnSpc>
+              <a:spcBef>
+                <a:spcPts val="200"/>
+              </a:spcBef>
+              <a:spcAft>
+                <a:spcPts val="400"/>
+              </a:spcAft>
+              <a:buClr>
+                <a:schemeClr val="tx1"/>
+              </a:buClr>
+              <a:buFont typeface="Wingdings" pitchFamily="2" charset="2"/>
+              <a:buChar char=""/>
+              <a:defRPr sz="1799" kern="1200">
+                <a:solidFill>
+                  <a:schemeClr val="tx1"/>
+                </a:solidFill>
+                <a:latin typeface="+mn-lt"/>
+                <a:ea typeface="+mn-ea"/>
+                <a:cs typeface="+mn-cs"/>
+              </a:defRPr>
+            </a:lvl3pPr>
+            <a:lvl4pPr marL="868419" indent="-182825" algn="l" defTabSz="914126" rtl="0" eaLnBrk="1" latinLnBrk="0" hangingPunct="1">
+              <a:lnSpc>
+                <a:spcPct val="90000"/>
+              </a:lnSpc>
+              <a:spcBef>
+                <a:spcPts val="200"/>
+              </a:spcBef>
+              <a:spcAft>
+                <a:spcPts val="400"/>
+              </a:spcAft>
+              <a:buClr>
+                <a:schemeClr val="tx1"/>
+              </a:buClr>
+              <a:buFont typeface="Wingdings" pitchFamily="2" charset="2"/>
+              <a:buChar char=""/>
+              <a:defRPr sz="1600" kern="1200">
+                <a:solidFill>
+                  <a:schemeClr val="tx1"/>
+                </a:solidFill>
+                <a:latin typeface="+mn-lt"/>
+                <a:ea typeface="+mn-ea"/>
+                <a:cs typeface="+mn-cs"/>
+              </a:defRPr>
+            </a:lvl4pPr>
+            <a:lvl5pPr marL="1096951" indent="-182825" algn="l" defTabSz="914126" rtl="0" eaLnBrk="1" latinLnBrk="0" hangingPunct="1">
+              <a:lnSpc>
+                <a:spcPct val="90000"/>
+              </a:lnSpc>
+              <a:spcBef>
+                <a:spcPts val="200"/>
+              </a:spcBef>
+              <a:spcAft>
+                <a:spcPts val="400"/>
+              </a:spcAft>
+              <a:buClr>
+                <a:schemeClr val="tx1"/>
+              </a:buClr>
+              <a:buFont typeface="Wingdings" pitchFamily="2" charset="2"/>
+              <a:buChar char=""/>
+              <a:defRPr sz="1600" kern="1200">
+                <a:solidFill>
+                  <a:schemeClr val="tx1"/>
+                </a:solidFill>
+                <a:latin typeface="+mn-lt"/>
+                <a:ea typeface="+mn-ea"/>
+                <a:cs typeface="+mn-cs"/>
+              </a:defRPr>
+            </a:lvl5pPr>
+            <a:lvl6pPr marL="1284215" indent="-228531" algn="l" defTabSz="914126" rtl="0" eaLnBrk="1" latinLnBrk="0" hangingPunct="1">
+              <a:lnSpc>
+                <a:spcPct val="90000"/>
+              </a:lnSpc>
+              <a:spcBef>
+                <a:spcPts val="200"/>
+              </a:spcBef>
+              <a:spcAft>
+                <a:spcPts val="400"/>
+              </a:spcAft>
+              <a:buClr>
+                <a:schemeClr val="tx1"/>
+              </a:buClr>
+              <a:buFont typeface="Wingdings" pitchFamily="2" charset="2"/>
+              <a:buChar char=""/>
+              <a:defRPr sz="1600" kern="1200">
+                <a:solidFill>
+                  <a:schemeClr val="tx1"/>
+                </a:solidFill>
+                <a:latin typeface="+mn-lt"/>
+                <a:ea typeface="+mn-ea"/>
+                <a:cs typeface="+mn-cs"/>
+              </a:defRPr>
+            </a:lvl6pPr>
+            <a:lvl7pPr marL="1471358" indent="-228531" algn="l" defTabSz="914126" rtl="0" eaLnBrk="1" latinLnBrk="0" hangingPunct="1">
+              <a:lnSpc>
+                <a:spcPct val="90000"/>
+              </a:lnSpc>
+              <a:spcBef>
+                <a:spcPts val="200"/>
+              </a:spcBef>
+              <a:spcAft>
+                <a:spcPts val="400"/>
+              </a:spcAft>
+              <a:buClr>
+                <a:schemeClr val="tx1"/>
+              </a:buClr>
+              <a:buFont typeface="Wingdings" pitchFamily="2" charset="2"/>
+              <a:buChar char=""/>
+              <a:defRPr sz="1600" kern="1200">
+                <a:solidFill>
+                  <a:schemeClr val="tx1"/>
+                </a:solidFill>
+                <a:latin typeface="+mn-lt"/>
+                <a:ea typeface="+mn-ea"/>
+                <a:cs typeface="+mn-cs"/>
+              </a:defRPr>
+            </a:lvl7pPr>
+            <a:lvl8pPr marL="1628511" indent="-228531" algn="l" defTabSz="914126" rtl="0" eaLnBrk="1" latinLnBrk="0" hangingPunct="1">
+              <a:lnSpc>
+                <a:spcPct val="90000"/>
+              </a:lnSpc>
+              <a:spcBef>
+                <a:spcPts val="200"/>
+              </a:spcBef>
+              <a:spcAft>
+                <a:spcPts val="400"/>
+              </a:spcAft>
+              <a:buClr>
+                <a:schemeClr val="tx1"/>
+              </a:buClr>
+              <a:buFont typeface="Wingdings" pitchFamily="2" charset="2"/>
+              <a:buChar char=""/>
+              <a:defRPr sz="1600" kern="1200">
+                <a:solidFill>
+                  <a:schemeClr val="tx1"/>
+                </a:solidFill>
+                <a:latin typeface="+mn-lt"/>
+                <a:ea typeface="+mn-ea"/>
+                <a:cs typeface="+mn-cs"/>
+              </a:defRPr>
+            </a:lvl8pPr>
+            <a:lvl9pPr marL="1805658" indent="-228531" algn="l" defTabSz="914126" rtl="0" eaLnBrk="1" latinLnBrk="0" hangingPunct="1">
+              <a:lnSpc>
+                <a:spcPct val="90000"/>
+              </a:lnSpc>
+              <a:spcBef>
+                <a:spcPts val="200"/>
+              </a:spcBef>
+              <a:spcAft>
+                <a:spcPts val="400"/>
+              </a:spcAft>
+              <a:buClr>
+                <a:schemeClr val="tx1"/>
+              </a:buClr>
+              <a:buFont typeface="Wingdings" pitchFamily="2" charset="2"/>
+              <a:buChar char=""/>
+              <a:defRPr sz="1600" kern="1200">
+                <a:solidFill>
+                  <a:schemeClr val="tx1"/>
+                </a:solidFill>
+                <a:latin typeface="+mn-lt"/>
+                <a:ea typeface="+mn-ea"/>
+                <a:cs typeface="+mn-cs"/>
+              </a:defRPr>
+            </a:lvl9pPr>
+          </a:lstStyle>
+          <a:p>
+            <a:r>
+              <a:rPr lang="en-US" sz="2800" dirty="0" err="1" smtClean="0"/>
+              <a:t>Bitbucket</a:t>
+            </a:r>
+            <a:endParaRPr lang="en-US" sz="2800" dirty="0" smtClean="0"/>
+          </a:p>
+          <a:p>
+            <a:pPr lvl="1"/>
+            <a:r>
+              <a:rPr lang="en-US" sz="2800" dirty="0" smtClean="0"/>
+              <a:t>Pull requests</a:t>
+            </a:r>
+          </a:p>
+          <a:p>
+            <a:pPr lvl="1"/>
+            <a:r>
+              <a:rPr lang="en-US" sz="2800" dirty="0" smtClean="0"/>
+              <a:t>Full Team Approval</a:t>
+            </a:r>
+          </a:p>
+          <a:p>
+            <a:pPr lvl="2"/>
+            <a:r>
+              <a:rPr lang="en-US" sz="2800" dirty="0" smtClean="0"/>
+              <a:t>Commenting for clarity and potential errors</a:t>
+            </a:r>
+          </a:p>
+          <a:p>
+            <a:pPr lvl="2"/>
+            <a:r>
+              <a:rPr lang="en-US" sz="2800" dirty="0" smtClean="0"/>
+              <a:t>Constant feedback</a:t>
+            </a:r>
+            <a:endParaRPr lang="en-US" sz="2800" dirty="0" smtClean="0"/>
           </a:p>
         </p:txBody>
       </p:sp>
@@ -7725,10 +8035,10 @@
             <a:pPr algn="ctr"/>
             <a:r>
               <a:rPr lang="en-US" sz="4400" dirty="0" smtClean="0"/>
-              <a:t>Project plan: Quality &amp;Tests </a:t>
-            </a:r>
-            <a:r>
-              <a:rPr lang="en-US" sz="2000" i="1" dirty="0" smtClean="0"/>
+              <a:t>QUALITY ASSURANCE </a:t>
+            </a:r>
+            <a:r>
+              <a:rPr lang="en-US" sz="2000" i="1" dirty="0"/>
               <a:t>(cont.)</a:t>
             </a:r>
             <a:endParaRPr lang="en-US" sz="2000" i="1" dirty="0"/>
@@ -7931,7 +8241,7 @@
             <a:pPr algn="ctr"/>
             <a:r>
               <a:rPr lang="en-US" dirty="0" smtClean="0"/>
-              <a:t>Architecture</a:t>
+              <a:t>Project Architecture</a:t>
             </a:r>
             <a:endParaRPr lang="en-US" dirty="0"/>
           </a:p>

</xml_diff>

<commit_message>
Added roles to title page. Fixed inconsistent transitions.
</commit_message>
<xml_diff>
--- a/Documentation/Presentations/CS425 Final Presentation.pptx
+++ b/Documentation/Presentations/CS425 Final Presentation.pptx
@@ -294,7 +294,7 @@
           <a:p>
             <a:fld id="{4954C6E1-AF92-4FB7-A013-0B520EBC30AE}" type="datetimeFigureOut">
               <a:rPr lang="en-US"/>
-              <a:t>11/16/2015</a:t>
+              <a:t>11/18/2015</a:t>
             </a:fld>
             <a:endParaRPr/>
           </a:p>
@@ -459,7 +459,7 @@
           <a:p>
             <a:fld id="{95C10850-0874-4A61-99B4-D613C5E8D9EA}" type="datetimeFigureOut">
               <a:rPr lang="en-US"/>
-              <a:t>11/16/2015</a:t>
+              <a:t>11/18/2015</a:t>
             </a:fld>
             <a:endParaRPr/>
           </a:p>
@@ -4677,6 +4677,7 @@
             </a:endParaRPr>
           </a:p>
           <a:p>
+            <a:pPr algn="l"/>
             <a:r>
               <a:rPr lang="en-US" sz="2400" dirty="0" smtClean="0">
                 <a:solidFill>
@@ -4686,10 +4687,19 @@
                   </a:schemeClr>
                 </a:solidFill>
               </a:rPr>
-              <a:t>Dylan Williams</a:t>
-            </a:r>
-          </a:p>
-          <a:p>
+              <a:t>	Dylan Williams		Quality Assurance</a:t>
+            </a:r>
+            <a:endParaRPr lang="en-US" sz="2400" dirty="0" smtClean="0">
+              <a:solidFill>
+                <a:schemeClr val="tx2">
+                  <a:lumMod val="90000"/>
+                  <a:lumOff val="10000"/>
+                </a:schemeClr>
+              </a:solidFill>
+            </a:endParaRPr>
+          </a:p>
+          <a:p>
+            <a:pPr algn="l"/>
             <a:r>
               <a:rPr lang="en-US" sz="2400" dirty="0" smtClean="0">
                 <a:solidFill>
@@ -4699,8 +4709,19 @@
                   </a:schemeClr>
                 </a:solidFill>
               </a:rPr>
-              <a:t>Spencer </a:t>
-            </a:r>
+              <a:t>	Spencer Smith		Customer Proxy</a:t>
+            </a:r>
+            <a:endParaRPr lang="en-US" sz="2400" dirty="0" smtClean="0">
+              <a:solidFill>
+                <a:schemeClr val="tx2">
+                  <a:lumMod val="90000"/>
+                  <a:lumOff val="10000"/>
+                </a:schemeClr>
+              </a:solidFill>
+            </a:endParaRPr>
+          </a:p>
+          <a:p>
+            <a:pPr algn="l"/>
             <a:r>
               <a:rPr lang="en-US" sz="2400" dirty="0" smtClean="0">
                 <a:solidFill>
@@ -4710,21 +4731,16 @@
                   </a:schemeClr>
                 </a:solidFill>
               </a:rPr>
-              <a:t>Smith</a:t>
-            </a:r>
-          </a:p>
-          <a:p>
-            <a:r>
-              <a:rPr lang="en-US" sz="2400" dirty="0" smtClean="0">
-                <a:solidFill>
-                  <a:schemeClr val="tx2">
-                    <a:lumMod val="90000"/>
-                    <a:lumOff val="10000"/>
-                  </a:schemeClr>
-                </a:solidFill>
-              </a:rPr>
-              <a:t>Nathan Reinhardt</a:t>
-            </a:r>
+              <a:t>	Nathan Reinhardt	Scrum Master</a:t>
+            </a:r>
+            <a:endParaRPr lang="en-US" sz="2400" dirty="0" smtClean="0">
+              <a:solidFill>
+                <a:schemeClr val="tx2">
+                  <a:lumMod val="90000"/>
+                  <a:lumOff val="10000"/>
+                </a:schemeClr>
+              </a:solidFill>
+            </a:endParaRPr>
           </a:p>
           <a:p>
             <a:endParaRPr lang="en-US" sz="3600" b="1" u="sng" dirty="0" smtClean="0">
@@ -4879,12 +4895,16 @@
   <p:clrMapOvr>
     <a:masterClrMapping/>
   </p:clrMapOvr>
-  <mc:AlternateContent xmlns:mc="http://schemas.openxmlformats.org/markup-compatibility/2006" xmlns:p14="http://schemas.microsoft.com/office/powerpoint/2010/main">
-    <mc:Choice Requires="p14">
-      <p:transition p14:dur="10"/>
+  <mc:AlternateContent xmlns:mc="http://schemas.openxmlformats.org/markup-compatibility/2006">
+    <mc:Choice xmlns:p14="http://schemas.microsoft.com/office/powerpoint/2010/main" Requires="p14">
+      <p:transition spd="med" p14:dur="700">
+        <p:fade/>
+      </p:transition>
     </mc:Choice>
-    <mc:Fallback xmlns="">
-      <p:transition/>
+    <mc:Fallback>
+      <p:transition spd="med">
+        <p:fade/>
+      </p:transition>
     </mc:Fallback>
   </mc:AlternateContent>
   <p:timing>
@@ -4932,11 +4952,7 @@
             <a:pPr algn="ctr"/>
             <a:r>
               <a:rPr lang="en-US" dirty="0" smtClean="0"/>
-              <a:t>Efforts </a:t>
-            </a:r>
-            <a:r>
-              <a:rPr lang="en-US" dirty="0" smtClean="0"/>
-              <a:t>&amp; Deliverables</a:t>
+              <a:t>Efforts &amp; Deliverables</a:t>
             </a:r>
             <a:endParaRPr lang="en-US" dirty="0"/>
           </a:p>
@@ -5116,19 +5132,11 @@
             <a:pPr algn="ctr"/>
             <a:r>
               <a:rPr lang="en-US" dirty="0" smtClean="0"/>
-              <a:t>Efforts </a:t>
-            </a:r>
-            <a:r>
-              <a:rPr lang="en-US" dirty="0" smtClean="0"/>
-              <a:t>&amp; Deliverables</a:t>
+              <a:t>Efforts &amp; Deliverables</a:t>
             </a:r>
             <a:r>
               <a:rPr lang="en-US" sz="2000" i="1" dirty="0" smtClean="0"/>
-              <a:t>(cont</a:t>
-            </a:r>
-            <a:r>
-              <a:rPr lang="en-US" sz="2000" i="1" dirty="0" smtClean="0"/>
-              <a:t>.)</a:t>
+              <a:t>(cont.)</a:t>
             </a:r>
             <a:endParaRPr lang="en-US" sz="2000" i="1" dirty="0"/>
           </a:p>
@@ -6315,12 +6323,16 @@
   <p:clrMapOvr>
     <a:masterClrMapping/>
   </p:clrMapOvr>
-  <mc:AlternateContent xmlns:mc="http://schemas.openxmlformats.org/markup-compatibility/2006" xmlns:p14="http://schemas.microsoft.com/office/powerpoint/2010/main">
-    <mc:Choice Requires="p14">
-      <p:transition p14:dur="0"/>
+  <mc:AlternateContent xmlns:mc="http://schemas.openxmlformats.org/markup-compatibility/2006">
+    <mc:Choice xmlns:p14="http://schemas.microsoft.com/office/powerpoint/2010/main" Requires="p14">
+      <p:transition spd="med" p14:dur="700">
+        <p:fade/>
+      </p:transition>
     </mc:Choice>
-    <mc:Fallback xmlns="">
-      <p:transition/>
+    <mc:Fallback>
+      <p:transition spd="med">
+        <p:fade/>
+      </p:transition>
     </mc:Fallback>
   </mc:AlternateContent>
   <p:timing>
@@ -6575,12 +6587,16 @@
   <p:clrMapOvr>
     <a:masterClrMapping/>
   </p:clrMapOvr>
-  <mc:AlternateContent xmlns:mc="http://schemas.openxmlformats.org/markup-compatibility/2006" xmlns:p14="http://schemas.microsoft.com/office/powerpoint/2010/main">
-    <mc:Choice Requires="p14">
-      <p:transition p14:dur="0"/>
+  <mc:AlternateContent xmlns:mc="http://schemas.openxmlformats.org/markup-compatibility/2006">
+    <mc:Choice xmlns:p14="http://schemas.microsoft.com/office/powerpoint/2010/main" Requires="p14">
+      <p:transition spd="med" p14:dur="700">
+        <p:fade/>
+      </p:transition>
     </mc:Choice>
-    <mc:Fallback xmlns="">
-      <p:transition/>
+    <mc:Fallback>
+      <p:transition spd="med">
+        <p:fade/>
+      </p:transition>
     </mc:Fallback>
   </mc:AlternateContent>
   <p:timing>
@@ -7462,12 +7478,16 @@
   <p:clrMapOvr>
     <a:masterClrMapping/>
   </p:clrMapOvr>
-  <mc:AlternateContent xmlns:mc="http://schemas.openxmlformats.org/markup-compatibility/2006" xmlns:p14="http://schemas.microsoft.com/office/powerpoint/2010/main">
-    <mc:Choice Requires="p14">
-      <p:transition p14:dur="0"/>
+  <mc:AlternateContent xmlns:mc="http://schemas.openxmlformats.org/markup-compatibility/2006">
+    <mc:Choice xmlns:p14="http://schemas.microsoft.com/office/powerpoint/2010/main" Requires="p14">
+      <p:transition spd="med" p14:dur="700">
+        <p:fade/>
+      </p:transition>
     </mc:Choice>
-    <mc:Fallback xmlns="">
-      <p:transition/>
+    <mc:Fallback>
+      <p:transition spd="med">
+        <p:fade/>
+      </p:transition>
     </mc:Fallback>
   </mc:AlternateContent>
   <p:timing>
@@ -7563,13 +7583,8 @@
             </a:r>
             <a:r>
               <a:rPr lang="en-US" sz="2800" dirty="0" smtClean="0"/>
-              <a:t> workflow </a:t>
-            </a:r>
-            <a:r>
-              <a:rPr lang="en-US" sz="2800" dirty="0" smtClean="0"/>
-              <a:t>to maintain consistency </a:t>
-            </a:r>
-            <a:endParaRPr lang="en-US" sz="2800" dirty="0" smtClean="0"/>
+              <a:t> workflow to maintain consistency </a:t>
+            </a:r>
           </a:p>
           <a:p>
             <a:pPr lvl="2"/>
@@ -7603,11 +7618,7 @@
             <a:pPr lvl="2"/>
             <a:r>
               <a:rPr lang="en-US" sz="2600" dirty="0" smtClean="0"/>
-              <a:t>Pul</a:t>
-            </a:r>
-            <a:r>
-              <a:rPr lang="en-US" sz="2600" dirty="0" smtClean="0"/>
-              <a:t>l Request</a:t>
+              <a:t>Pull Request</a:t>
             </a:r>
           </a:p>
           <a:p>
@@ -7616,7 +7627,6 @@
               <a:rPr lang="en-US" sz="2600" dirty="0" smtClean="0"/>
               <a:t>Merge to Master</a:t>
             </a:r>
-            <a:endParaRPr lang="en-US" sz="2600" dirty="0" smtClean="0"/>
           </a:p>
         </p:txBody>
       </p:sp>
@@ -7966,7 +7976,6 @@
               <a:rPr lang="en-US" sz="2800" dirty="0" smtClean="0"/>
               <a:t>Constant feedback</a:t>
             </a:r>
-            <a:endParaRPr lang="en-US" sz="2800" dirty="0" smtClean="0"/>
           </a:p>
         </p:txBody>
       </p:sp>
@@ -7980,12 +7989,16 @@
   <p:clrMapOvr>
     <a:masterClrMapping/>
   </p:clrMapOvr>
-  <mc:AlternateContent xmlns:mc="http://schemas.openxmlformats.org/markup-compatibility/2006" xmlns:p14="http://schemas.microsoft.com/office/powerpoint/2010/main">
-    <mc:Choice Requires="p14">
-      <p:transition p14:dur="0"/>
+  <mc:AlternateContent xmlns:mc="http://schemas.openxmlformats.org/markup-compatibility/2006">
+    <mc:Choice xmlns:p14="http://schemas.microsoft.com/office/powerpoint/2010/main" Requires="p14">
+      <p:transition spd="med" p14:dur="700">
+        <p:fade/>
+      </p:transition>
     </mc:Choice>
-    <mc:Fallback xmlns="">
-      <p:transition/>
+    <mc:Fallback>
+      <p:transition spd="med">
+        <p:fade/>
+      </p:transition>
     </mc:Fallback>
   </mc:AlternateContent>
   <p:timing>
@@ -8041,7 +8054,6 @@
               <a:rPr lang="en-US" sz="2000" i="1" dirty="0"/>
               <a:t>(cont.)</a:t>
             </a:r>
-            <a:endParaRPr lang="en-US" sz="2000" i="1" dirty="0"/>
           </a:p>
         </p:txBody>
       </p:sp>
@@ -8188,12 +8200,16 @@
   <p:clrMapOvr>
     <a:masterClrMapping/>
   </p:clrMapOvr>
-  <mc:AlternateContent xmlns:mc="http://schemas.openxmlformats.org/markup-compatibility/2006" xmlns:p14="http://schemas.microsoft.com/office/powerpoint/2010/main">
-    <mc:Choice Requires="p14">
-      <p:transition p14:dur="0"/>
+  <mc:AlternateContent xmlns:mc="http://schemas.openxmlformats.org/markup-compatibility/2006">
+    <mc:Choice xmlns:p14="http://schemas.microsoft.com/office/powerpoint/2010/main" Requires="p14">
+      <p:transition spd="med" p14:dur="700">
+        <p:fade/>
+      </p:transition>
     </mc:Choice>
-    <mc:Fallback xmlns="">
-      <p:transition/>
+    <mc:Fallback>
+      <p:transition spd="med">
+        <p:fade/>
+      </p:transition>
     </mc:Fallback>
   </mc:AlternateContent>
   <p:timing>

</xml_diff>

<commit_message>
format footer and add mamangment slides
</commit_message>
<xml_diff>
--- a/Documentation/Presentations/CS425 Final Presentation.pptx
+++ b/Documentation/Presentations/CS425 Final Presentation.pptx
@@ -294,7 +294,7 @@
           <a:p>
             <a:fld id="{4954C6E1-AF92-4FB7-A013-0B520EBC30AE}" type="datetimeFigureOut">
               <a:rPr lang="en-US"/>
-              <a:t>11/20/2015</a:t>
+              <a:t>04/10/2016</a:t>
             </a:fld>
             <a:endParaRPr/>
           </a:p>
@@ -459,7 +459,7 @@
           <a:p>
             <a:fld id="{95C10850-0874-4A61-99B4-D613C5E8D9EA}" type="datetimeFigureOut">
               <a:rPr lang="en-US"/>
-              <a:t>11/20/2015</a:t>
+              <a:t>04/10/2016</a:t>
             </a:fld>
             <a:endParaRPr/>
           </a:p>
@@ -7137,8 +7137,8 @@
           <a:p>
             <a:pPr algn="ctr"/>
             <a:r>
-              <a:rPr lang="en-US" dirty="0" smtClean="0"/>
-              <a:t>Project Plan: Management</a:t>
+              <a:rPr lang="en-US" smtClean="0"/>
+              <a:t>Team Management</a:t>
             </a:r>
             <a:endParaRPr lang="en-US" dirty="0"/>
           </a:p>

</xml_diff>